<commit_message>
worked on modulation, diagram, and report
</commit_message>
<xml_diff>
--- a/Project 1/Functional Flow Diagram.pptx
+++ b/Project 1/Functional Flow Diagram.pptx
@@ -104,6 +104,11 @@
       </a:defRPr>
     </a:lvl9pPr>
   </p:defaultTextStyle>
+  <p:extLst>
+    <p:ext uri="{EFAFB233-063F-42B5-8137-9DF3F51BA10A}">
+      <p15:sldGuideLst xmlns:p15="http://schemas.microsoft.com/office/powerpoint/2012/main"/>
+    </p:ext>
+  </p:extLst>
 </p:presentation>
 </file>
 
@@ -254,7 +259,7 @@
           <a:p>
             <a:fld id="{06B2AA2C-C863-4A3F-89A7-07245FFB4644}" type="datetimeFigureOut">
               <a:rPr lang="en-US" smtClean="0"/>
-              <a:t>3/20/2023</a:t>
+              <a:t>3/21/2023</a:t>
             </a:fld>
             <a:endParaRPr lang="en-US"/>
           </a:p>
@@ -452,7 +457,7 @@
           <a:p>
             <a:fld id="{06B2AA2C-C863-4A3F-89A7-07245FFB4644}" type="datetimeFigureOut">
               <a:rPr lang="en-US" smtClean="0"/>
-              <a:t>3/20/2023</a:t>
+              <a:t>3/21/2023</a:t>
             </a:fld>
             <a:endParaRPr lang="en-US"/>
           </a:p>
@@ -660,7 +665,7 @@
           <a:p>
             <a:fld id="{06B2AA2C-C863-4A3F-89A7-07245FFB4644}" type="datetimeFigureOut">
               <a:rPr lang="en-US" smtClean="0"/>
-              <a:t>3/20/2023</a:t>
+              <a:t>3/21/2023</a:t>
             </a:fld>
             <a:endParaRPr lang="en-US"/>
           </a:p>
@@ -858,7 +863,7 @@
           <a:p>
             <a:fld id="{06B2AA2C-C863-4A3F-89A7-07245FFB4644}" type="datetimeFigureOut">
               <a:rPr lang="en-US" smtClean="0"/>
-              <a:t>3/20/2023</a:t>
+              <a:t>3/21/2023</a:t>
             </a:fld>
             <a:endParaRPr lang="en-US"/>
           </a:p>
@@ -1133,7 +1138,7 @@
           <a:p>
             <a:fld id="{06B2AA2C-C863-4A3F-89A7-07245FFB4644}" type="datetimeFigureOut">
               <a:rPr lang="en-US" smtClean="0"/>
-              <a:t>3/20/2023</a:t>
+              <a:t>3/21/2023</a:t>
             </a:fld>
             <a:endParaRPr lang="en-US"/>
           </a:p>
@@ -1398,7 +1403,7 @@
           <a:p>
             <a:fld id="{06B2AA2C-C863-4A3F-89A7-07245FFB4644}" type="datetimeFigureOut">
               <a:rPr lang="en-US" smtClean="0"/>
-              <a:t>3/20/2023</a:t>
+              <a:t>3/21/2023</a:t>
             </a:fld>
             <a:endParaRPr lang="en-US"/>
           </a:p>
@@ -1810,7 +1815,7 @@
           <a:p>
             <a:fld id="{06B2AA2C-C863-4A3F-89A7-07245FFB4644}" type="datetimeFigureOut">
               <a:rPr lang="en-US" smtClean="0"/>
-              <a:t>3/20/2023</a:t>
+              <a:t>3/21/2023</a:t>
             </a:fld>
             <a:endParaRPr lang="en-US"/>
           </a:p>
@@ -1951,7 +1956,7 @@
           <a:p>
             <a:fld id="{06B2AA2C-C863-4A3F-89A7-07245FFB4644}" type="datetimeFigureOut">
               <a:rPr lang="en-US" smtClean="0"/>
-              <a:t>3/20/2023</a:t>
+              <a:t>3/21/2023</a:t>
             </a:fld>
             <a:endParaRPr lang="en-US"/>
           </a:p>
@@ -2064,7 +2069,7 @@
           <a:p>
             <a:fld id="{06B2AA2C-C863-4A3F-89A7-07245FFB4644}" type="datetimeFigureOut">
               <a:rPr lang="en-US" smtClean="0"/>
-              <a:t>3/20/2023</a:t>
+              <a:t>3/21/2023</a:t>
             </a:fld>
             <a:endParaRPr lang="en-US"/>
           </a:p>
@@ -2375,7 +2380,7 @@
           <a:p>
             <a:fld id="{06B2AA2C-C863-4A3F-89A7-07245FFB4644}" type="datetimeFigureOut">
               <a:rPr lang="en-US" smtClean="0"/>
-              <a:t>3/20/2023</a:t>
+              <a:t>3/21/2023</a:t>
             </a:fld>
             <a:endParaRPr lang="en-US"/>
           </a:p>
@@ -2663,7 +2668,7 @@
           <a:p>
             <a:fld id="{06B2AA2C-C863-4A3F-89A7-07245FFB4644}" type="datetimeFigureOut">
               <a:rPr lang="en-US" smtClean="0"/>
-              <a:t>3/20/2023</a:t>
+              <a:t>3/21/2023</a:t>
             </a:fld>
             <a:endParaRPr lang="en-US"/>
           </a:p>
@@ -2904,7 +2909,7 @@
           <a:p>
             <a:fld id="{06B2AA2C-C863-4A3F-89A7-07245FFB4644}" type="datetimeFigureOut">
               <a:rPr lang="en-US" smtClean="0"/>
-              <a:t>3/20/2023</a:t>
+              <a:t>3/21/2023</a:t>
             </a:fld>
             <a:endParaRPr lang="en-US"/>
           </a:p>
@@ -3335,7 +3340,7 @@
         </p:nvSpPr>
         <p:spPr>
           <a:xfrm>
-            <a:off x="280554" y="342900"/>
+            <a:off x="1618364" y="1052031"/>
             <a:ext cx="1548246" cy="280554"/>
           </a:xfrm>
           <a:prstGeom prst="rect">
@@ -3397,7 +3402,7 @@
         </p:nvSpPr>
         <p:spPr>
           <a:xfrm>
-            <a:off x="2438398" y="342900"/>
+            <a:off x="3776208" y="1052031"/>
             <a:ext cx="1769919" cy="280554"/>
           </a:xfrm>
           <a:prstGeom prst="rect">
@@ -3440,7 +3445,7 @@
                   <a:schemeClr val="tx1"/>
                 </a:solidFill>
               </a:rPr>
-              <a:t>Ascii Conversion</a:t>
+              <a:t>ASCII Conversion</a:t>
             </a:r>
           </a:p>
         </p:txBody>
@@ -3459,7 +3464,7 @@
         </p:nvSpPr>
         <p:spPr>
           <a:xfrm>
-            <a:off x="4817915" y="218209"/>
+            <a:off x="6155725" y="927340"/>
             <a:ext cx="1967349" cy="529936"/>
           </a:xfrm>
           <a:prstGeom prst="rect">
@@ -3524,7 +3529,7 @@
         </p:nvCxnSpPr>
         <p:spPr>
           <a:xfrm>
-            <a:off x="1828800" y="483177"/>
+            <a:off x="3166610" y="1192308"/>
             <a:ext cx="609598" cy="0"/>
           </a:xfrm>
           <a:prstGeom prst="straightConnector1">
@@ -3566,7 +3571,7 @@
         </p:nvCxnSpPr>
         <p:spPr>
           <a:xfrm>
-            <a:off x="4208317" y="483177"/>
+            <a:off x="5546127" y="1192308"/>
             <a:ext cx="609598" cy="0"/>
           </a:xfrm>
           <a:prstGeom prst="straightConnector1">
@@ -3605,7 +3610,7 @@
         </p:nvSpPr>
         <p:spPr>
           <a:xfrm>
-            <a:off x="7394862" y="342900"/>
+            <a:off x="8732672" y="1052031"/>
             <a:ext cx="1769919" cy="280554"/>
           </a:xfrm>
           <a:prstGeom prst="rect">
@@ -3670,7 +3675,7 @@
         </p:nvCxnSpPr>
         <p:spPr>
           <a:xfrm>
-            <a:off x="6785264" y="483177"/>
+            <a:off x="8123074" y="1192308"/>
             <a:ext cx="609598" cy="0"/>
           </a:xfrm>
           <a:prstGeom prst="straightConnector1">
@@ -3707,17 +3712,19 @@
           <p:cNvCxnSpPr>
             <a:cxnSpLocks/>
             <a:stCxn id="12" idx="3"/>
-            <a:endCxn id="20" idx="0"/>
+            <a:endCxn id="20" idx="3"/>
           </p:cNvCxnSpPr>
           <p:nvPr/>
         </p:nvCxnSpPr>
         <p:spPr>
-          <a:xfrm>
-            <a:off x="9164781" y="483177"/>
-            <a:ext cx="1930976" cy="770658"/>
+          <a:xfrm flipH="1">
+            <a:off x="9121486" y="1192308"/>
+            <a:ext cx="1381105" cy="2591258"/>
           </a:xfrm>
-          <a:prstGeom prst="straightConnector1">
-            <a:avLst/>
+          <a:prstGeom prst="bentConnector3">
+            <a:avLst>
+              <a:gd name="adj1" fmla="val -16552"/>
+            </a:avLst>
           </a:prstGeom>
           <a:ln>
             <a:tailEnd type="triangle"/>
@@ -3752,8 +3759,8 @@
         </p:nvSpPr>
         <p:spPr>
           <a:xfrm>
-            <a:off x="10659338" y="1253835"/>
-            <a:ext cx="872837" cy="4170219"/>
+            <a:off x="7890161" y="2392685"/>
+            <a:ext cx="1231325" cy="2781761"/>
           </a:xfrm>
           <a:prstGeom prst="rect">
             <a:avLst/>
@@ -3795,21 +3802,8 @@
                   <a:schemeClr val="tx1"/>
                 </a:solidFill>
               </a:rPr>
-              <a:t>Serial to Parallel </a:t>
-            </a:r>
-            <a:r>
-              <a:rPr lang="en-US" dirty="0" err="1">
-                <a:solidFill>
-                  <a:schemeClr val="tx1"/>
-                </a:solidFill>
-              </a:rPr>
-              <a:t>Conver-sion</a:t>
-            </a:r>
-            <a:endParaRPr lang="en-US" dirty="0">
-              <a:solidFill>
-                <a:schemeClr val="tx1"/>
-              </a:solidFill>
-            </a:endParaRPr>
+              <a:t>Serial to Parallel Conversion</a:t>
+            </a:r>
           </a:p>
         </p:txBody>
       </p:sp>
@@ -3827,8 +3821,8 @@
         </p:nvSpPr>
         <p:spPr>
           <a:xfrm>
-            <a:off x="9469580" y="1253835"/>
-            <a:ext cx="609598" cy="4170219"/>
+            <a:off x="6741320" y="2392685"/>
+            <a:ext cx="609598" cy="2781761"/>
           </a:xfrm>
           <a:prstGeom prst="rect">
             <a:avLst/>
@@ -3885,6 +3879,7 @@
             </a:extLst>
           </p:cNvPr>
           <p:cNvCxnSpPr>
+            <a:cxnSpLocks/>
             <a:stCxn id="20" idx="1"/>
             <a:endCxn id="28" idx="3"/>
           </p:cNvCxnSpPr>
@@ -3892,8 +3887,8 @@
         </p:nvCxnSpPr>
         <p:spPr>
           <a:xfrm flipH="1">
-            <a:off x="10079178" y="3338945"/>
-            <a:ext cx="580160" cy="0"/>
+            <a:off x="7350918" y="3783566"/>
+            <a:ext cx="539243" cy="0"/>
           </a:xfrm>
           <a:prstGeom prst="straightConnector1">
             <a:avLst/>
@@ -3931,7 +3926,7 @@
         </p:nvSpPr>
         <p:spPr>
           <a:xfrm>
-            <a:off x="7006935" y="3073976"/>
+            <a:off x="4522646" y="3518598"/>
             <a:ext cx="1769919" cy="529936"/>
           </a:xfrm>
           <a:prstGeom prst="rect">
@@ -3989,15 +3984,16 @@
             </a:extLst>
           </p:cNvPr>
           <p:cNvCxnSpPr>
+            <a:cxnSpLocks/>
             <a:stCxn id="28" idx="1"/>
             <a:endCxn id="31" idx="3"/>
           </p:cNvCxnSpPr>
           <p:nvPr/>
         </p:nvCxnSpPr>
         <p:spPr>
-          <a:xfrm flipH="1" flipV="1">
-            <a:off x="8776854" y="3338944"/>
-            <a:ext cx="692726" cy="1"/>
+          <a:xfrm flipH="1">
+            <a:off x="6292565" y="3783566"/>
+            <a:ext cx="448755" cy="0"/>
           </a:xfrm>
           <a:prstGeom prst="straightConnector1">
             <a:avLst/>
@@ -4035,7 +4031,7 @@
         </p:nvSpPr>
         <p:spPr>
           <a:xfrm>
-            <a:off x="4627418" y="3073976"/>
+            <a:off x="2143129" y="3518598"/>
             <a:ext cx="1769919" cy="529936"/>
           </a:xfrm>
           <a:prstGeom prst="rect">
@@ -4100,7 +4096,7 @@
         </p:nvCxnSpPr>
         <p:spPr>
           <a:xfrm flipH="1">
-            <a:off x="6397337" y="3338944"/>
+            <a:off x="3913048" y="3783566"/>
             <a:ext cx="609598" cy="0"/>
           </a:xfrm>
           <a:prstGeom prst="straightConnector1">
@@ -4139,8 +4135,8 @@
         </p:nvSpPr>
         <p:spPr>
           <a:xfrm>
-            <a:off x="280554" y="748145"/>
-            <a:ext cx="1444343" cy="369332"/>
+            <a:off x="1618364" y="1457276"/>
+            <a:ext cx="1444343" cy="646331"/>
           </a:xfrm>
           <a:prstGeom prst="rect">
             <a:avLst/>
@@ -4155,6 +4151,12 @@
           <a:p>
             <a:r>
               <a:rPr lang="en-US" dirty="0"/>
+              <a:t>‘Hello’</a:t>
+            </a:r>
+          </a:p>
+          <a:p>
+            <a:r>
+              <a:rPr lang="en-US" i="1" dirty="0"/>
               <a:t>Text</a:t>
             </a:r>
           </a:p>
@@ -4174,8 +4176,8 @@
         </p:nvSpPr>
         <p:spPr>
           <a:xfrm>
-            <a:off x="2438398" y="748145"/>
-            <a:ext cx="1444343" cy="369332"/>
+            <a:off x="3776208" y="1457276"/>
+            <a:ext cx="1666016" cy="646331"/>
           </a:xfrm>
           <a:prstGeom prst="rect">
             <a:avLst/>
@@ -4190,7 +4192,13 @@
           <a:p>
             <a:r>
               <a:rPr lang="en-US" dirty="0"/>
-              <a:t>Ascii Symbols</a:t>
+              <a:t>72 101…</a:t>
+            </a:r>
+          </a:p>
+          <a:p>
+            <a:r>
+              <a:rPr lang="en-US" i="1" dirty="0"/>
+              <a:t>ASCII Symbols</a:t>
             </a:r>
           </a:p>
         </p:txBody>
@@ -4209,8 +4217,8 @@
         </p:nvSpPr>
         <p:spPr>
           <a:xfrm>
-            <a:off x="4817916" y="748145"/>
-            <a:ext cx="1444343" cy="369332"/>
+            <a:off x="6155726" y="1457276"/>
+            <a:ext cx="2140528" cy="646331"/>
           </a:xfrm>
           <a:prstGeom prst="rect">
             <a:avLst/>
@@ -4225,6 +4233,12 @@
           <a:p>
             <a:r>
               <a:rPr lang="en-US" dirty="0"/>
+              <a:t>01001000 01100101</a:t>
+            </a:r>
+          </a:p>
+          <a:p>
+            <a:r>
+              <a:rPr lang="en-US" i="1" dirty="0"/>
               <a:t>Binary</a:t>
             </a:r>
           </a:p>
@@ -4244,8 +4258,8 @@
         </p:nvSpPr>
         <p:spPr>
           <a:xfrm>
-            <a:off x="7394862" y="748145"/>
-            <a:ext cx="1444343" cy="369332"/>
+            <a:off x="8732672" y="1457276"/>
+            <a:ext cx="1769919" cy="646331"/>
           </a:xfrm>
           <a:prstGeom prst="rect">
             <a:avLst/>
@@ -4260,6 +4274,12 @@
           <a:p>
             <a:r>
               <a:rPr lang="en-US" dirty="0"/>
+              <a:t>-1.2344 -0.6172j</a:t>
+            </a:r>
+          </a:p>
+          <a:p>
+            <a:r>
+              <a:rPr lang="en-US" i="1" dirty="0"/>
               <a:t>Symbols</a:t>
             </a:r>
           </a:p>
@@ -4279,8 +4299,8 @@
         </p:nvSpPr>
         <p:spPr>
           <a:xfrm>
-            <a:off x="9408097" y="5429249"/>
-            <a:ext cx="1444343" cy="369332"/>
+            <a:off x="6503818" y="5254748"/>
+            <a:ext cx="1444343" cy="646331"/>
           </a:xfrm>
           <a:prstGeom prst="rect">
             <a:avLst/>
@@ -4295,7 +4315,209 @@
           <a:p>
             <a:r>
               <a:rPr lang="en-US" dirty="0"/>
+              <a:t>Orthogonal</a:t>
+            </a:r>
+          </a:p>
+          <a:p>
+            <a:r>
+              <a:rPr lang="en-US" dirty="0"/>
               <a:t>Phasors</a:t>
+            </a:r>
+          </a:p>
+        </p:txBody>
+      </p:sp>
+      <p:sp>
+        <p:nvSpPr>
+          <p:cNvPr id="2" name="TextBox 1">
+            <a:extLst>
+              <a:ext uri="{FF2B5EF4-FFF2-40B4-BE49-F238E27FC236}">
+                <a16:creationId xmlns:a16="http://schemas.microsoft.com/office/drawing/2014/main" id="{EA545BB8-FC77-67AC-9B4C-A97FE91A2599}"/>
+              </a:ext>
+            </a:extLst>
+          </p:cNvPr>
+          <p:cNvSpPr txBox="1"/>
+          <p:nvPr/>
+        </p:nvSpPr>
+        <p:spPr>
+          <a:xfrm>
+            <a:off x="7898820" y="5637936"/>
+            <a:ext cx="529070" cy="369332"/>
+          </a:xfrm>
+          <a:prstGeom prst="rect">
+            <a:avLst/>
+          </a:prstGeom>
+          <a:noFill/>
+        </p:spPr>
+        <p:txBody>
+          <a:bodyPr wrap="square" rtlCol="0">
+            <a:spAutoFit/>
+          </a:bodyPr>
+          <a:lstStyle/>
+          <a:p>
+            <a:r>
+              <a:rPr lang="en-US" dirty="0"/>
+              <a:t>[…]</a:t>
+            </a:r>
+          </a:p>
+        </p:txBody>
+      </p:sp>
+      <p:sp>
+        <p:nvSpPr>
+          <p:cNvPr id="3" name="TextBox 2">
+            <a:extLst>
+              <a:ext uri="{FF2B5EF4-FFF2-40B4-BE49-F238E27FC236}">
+                <a16:creationId xmlns:a16="http://schemas.microsoft.com/office/drawing/2014/main" id="{F6D63A3E-3687-3C9C-B76C-9A8C42E32204}"/>
+              </a:ext>
+            </a:extLst>
+          </p:cNvPr>
+          <p:cNvSpPr txBox="1"/>
+          <p:nvPr/>
+        </p:nvSpPr>
+        <p:spPr>
+          <a:xfrm rot="5400000">
+            <a:off x="8520549" y="5600018"/>
+            <a:ext cx="1059871" cy="369332"/>
+          </a:xfrm>
+          <a:prstGeom prst="rect">
+            <a:avLst/>
+          </a:prstGeom>
+          <a:noFill/>
+        </p:spPr>
+        <p:txBody>
+          <a:bodyPr wrap="square" rtlCol="0">
+            <a:spAutoFit/>
+          </a:bodyPr>
+          <a:lstStyle/>
+          <a:p>
+            <a:r>
+              <a:rPr lang="en-US" dirty="0"/>
+              <a:t> [ … … … ]</a:t>
+            </a:r>
+          </a:p>
+        </p:txBody>
+      </p:sp>
+      <p:cxnSp>
+        <p:nvCxnSpPr>
+          <p:cNvPr id="8" name="Straight Arrow Connector 7">
+            <a:extLst>
+              <a:ext uri="{FF2B5EF4-FFF2-40B4-BE49-F238E27FC236}">
+                <a16:creationId xmlns:a16="http://schemas.microsoft.com/office/drawing/2014/main" id="{4535E8A2-D8BE-62BD-1088-254489F6CCC3}"/>
+              </a:ext>
+            </a:extLst>
+          </p:cNvPr>
+          <p:cNvCxnSpPr>
+            <a:cxnSpLocks/>
+            <a:stCxn id="2" idx="3"/>
+          </p:cNvCxnSpPr>
+          <p:nvPr/>
+        </p:nvCxnSpPr>
+        <p:spPr>
+          <a:xfrm flipV="1">
+            <a:off x="8427890" y="5818048"/>
+            <a:ext cx="403929" cy="4554"/>
+          </a:xfrm>
+          <a:prstGeom prst="straightConnector1">
+            <a:avLst/>
+          </a:prstGeom>
+          <a:ln>
+            <a:tailEnd type="triangle"/>
+          </a:ln>
+        </p:spPr>
+        <p:style>
+          <a:lnRef idx="1">
+            <a:schemeClr val="accent1"/>
+          </a:lnRef>
+          <a:fillRef idx="0">
+            <a:schemeClr val="accent1"/>
+          </a:fillRef>
+          <a:effectRef idx="0">
+            <a:schemeClr val="accent1"/>
+          </a:effectRef>
+          <a:fontRef idx="minor">
+            <a:schemeClr val="tx1"/>
+          </a:fontRef>
+        </p:style>
+      </p:cxnSp>
+      <p:sp>
+        <p:nvSpPr>
+          <p:cNvPr id="22" name="TextBox 21">
+            <a:extLst>
+              <a:ext uri="{FF2B5EF4-FFF2-40B4-BE49-F238E27FC236}">
+                <a16:creationId xmlns:a16="http://schemas.microsoft.com/office/drawing/2014/main" id="{0A286053-EACF-EC49-EE0C-01A48A0CABEA}"/>
+              </a:ext>
+            </a:extLst>
+          </p:cNvPr>
+          <p:cNvSpPr txBox="1"/>
+          <p:nvPr/>
+        </p:nvSpPr>
+        <p:spPr>
+          <a:xfrm>
+            <a:off x="2364800" y="4245230"/>
+            <a:ext cx="1326575" cy="369332"/>
+          </a:xfrm>
+          <a:prstGeom prst="rect">
+            <a:avLst/>
+          </a:prstGeom>
+          <a:noFill/>
+        </p:spPr>
+        <p:txBody>
+          <a:bodyPr wrap="square" rtlCol="0">
+            <a:spAutoFit/>
+          </a:bodyPr>
+          <a:lstStyle/>
+          <a:p>
+            <a:r>
+              <a:rPr lang="en-US" dirty="0"/>
+              <a:t>[ … … … … ]</a:t>
+            </a:r>
+          </a:p>
+        </p:txBody>
+      </p:sp>
+      <p:sp>
+        <p:nvSpPr>
+          <p:cNvPr id="23" name="TextBox 22">
+            <a:extLst>
+              <a:ext uri="{FF2B5EF4-FFF2-40B4-BE49-F238E27FC236}">
+                <a16:creationId xmlns:a16="http://schemas.microsoft.com/office/drawing/2014/main" id="{4F15D7B6-A84D-9015-F584-1CF886367243}"/>
+              </a:ext>
+            </a:extLst>
+          </p:cNvPr>
+          <p:cNvSpPr txBox="1"/>
+          <p:nvPr/>
+        </p:nvSpPr>
+        <p:spPr>
+          <a:xfrm>
+            <a:off x="4744317" y="4245230"/>
+            <a:ext cx="1326575" cy="646331"/>
+          </a:xfrm>
+          <a:prstGeom prst="rect">
+            <a:avLst/>
+          </a:prstGeom>
+          <a:noFill/>
+        </p:spPr>
+        <p:txBody>
+          <a:bodyPr wrap="square" rtlCol="0">
+            <a:spAutoFit/>
+          </a:bodyPr>
+          <a:lstStyle/>
+          <a:p>
+            <a:r>
+              <a:rPr lang="en-US" dirty="0"/>
+              <a:t>[ </a:t>
+            </a:r>
+            <a:r>
+              <a:rPr lang="en-US" i="1" dirty="0"/>
+              <a:t>D</a:t>
+            </a:r>
+            <a:r>
+              <a:rPr lang="en-US" dirty="0"/>
+              <a:t> A B C D ]</a:t>
+            </a:r>
+          </a:p>
+          <a:p>
+            <a:r>
+              <a:rPr lang="en-US" i="1" dirty="0"/>
+              <a:t>Redundancy</a:t>
             </a:r>
           </a:p>
         </p:txBody>

</xml_diff>

<commit_message>
Update Functional Flow Diagram.pptx
</commit_message>
<xml_diff>
--- a/Project 1/Functional Flow Diagram.pptx
+++ b/Project 1/Functional Flow Diagram.pptx
@@ -6,6 +6,7 @@
   </p:sldMasterIdLst>
   <p:sldIdLst>
     <p:sldId id="256" r:id="rId2"/>
+    <p:sldId id="257" r:id="rId3"/>
   </p:sldIdLst>
   <p:sldSz cx="12192000" cy="6858000"/>
   <p:notesSz cx="6858000" cy="9144000"/>
@@ -259,7 +260,7 @@
           <a:p>
             <a:fld id="{06B2AA2C-C863-4A3F-89A7-07245FFB4644}" type="datetimeFigureOut">
               <a:rPr lang="en-US" smtClean="0"/>
-              <a:t>3/21/2023</a:t>
+              <a:t>3/22/2023</a:t>
             </a:fld>
             <a:endParaRPr lang="en-US"/>
           </a:p>
@@ -457,7 +458,7 @@
           <a:p>
             <a:fld id="{06B2AA2C-C863-4A3F-89A7-07245FFB4644}" type="datetimeFigureOut">
               <a:rPr lang="en-US" smtClean="0"/>
-              <a:t>3/21/2023</a:t>
+              <a:t>3/22/2023</a:t>
             </a:fld>
             <a:endParaRPr lang="en-US"/>
           </a:p>
@@ -665,7 +666,7 @@
           <a:p>
             <a:fld id="{06B2AA2C-C863-4A3F-89A7-07245FFB4644}" type="datetimeFigureOut">
               <a:rPr lang="en-US" smtClean="0"/>
-              <a:t>3/21/2023</a:t>
+              <a:t>3/22/2023</a:t>
             </a:fld>
             <a:endParaRPr lang="en-US"/>
           </a:p>
@@ -863,7 +864,7 @@
           <a:p>
             <a:fld id="{06B2AA2C-C863-4A3F-89A7-07245FFB4644}" type="datetimeFigureOut">
               <a:rPr lang="en-US" smtClean="0"/>
-              <a:t>3/21/2023</a:t>
+              <a:t>3/22/2023</a:t>
             </a:fld>
             <a:endParaRPr lang="en-US"/>
           </a:p>
@@ -1138,7 +1139,7 @@
           <a:p>
             <a:fld id="{06B2AA2C-C863-4A3F-89A7-07245FFB4644}" type="datetimeFigureOut">
               <a:rPr lang="en-US" smtClean="0"/>
-              <a:t>3/21/2023</a:t>
+              <a:t>3/22/2023</a:t>
             </a:fld>
             <a:endParaRPr lang="en-US"/>
           </a:p>
@@ -1403,7 +1404,7 @@
           <a:p>
             <a:fld id="{06B2AA2C-C863-4A3F-89A7-07245FFB4644}" type="datetimeFigureOut">
               <a:rPr lang="en-US" smtClean="0"/>
-              <a:t>3/21/2023</a:t>
+              <a:t>3/22/2023</a:t>
             </a:fld>
             <a:endParaRPr lang="en-US"/>
           </a:p>
@@ -1815,7 +1816,7 @@
           <a:p>
             <a:fld id="{06B2AA2C-C863-4A3F-89A7-07245FFB4644}" type="datetimeFigureOut">
               <a:rPr lang="en-US" smtClean="0"/>
-              <a:t>3/21/2023</a:t>
+              <a:t>3/22/2023</a:t>
             </a:fld>
             <a:endParaRPr lang="en-US"/>
           </a:p>
@@ -1956,7 +1957,7 @@
           <a:p>
             <a:fld id="{06B2AA2C-C863-4A3F-89A7-07245FFB4644}" type="datetimeFigureOut">
               <a:rPr lang="en-US" smtClean="0"/>
-              <a:t>3/21/2023</a:t>
+              <a:t>3/22/2023</a:t>
             </a:fld>
             <a:endParaRPr lang="en-US"/>
           </a:p>
@@ -2069,7 +2070,7 @@
           <a:p>
             <a:fld id="{06B2AA2C-C863-4A3F-89A7-07245FFB4644}" type="datetimeFigureOut">
               <a:rPr lang="en-US" smtClean="0"/>
-              <a:t>3/21/2023</a:t>
+              <a:t>3/22/2023</a:t>
             </a:fld>
             <a:endParaRPr lang="en-US"/>
           </a:p>
@@ -2380,7 +2381,7 @@
           <a:p>
             <a:fld id="{06B2AA2C-C863-4A3F-89A7-07245FFB4644}" type="datetimeFigureOut">
               <a:rPr lang="en-US" smtClean="0"/>
-              <a:t>3/21/2023</a:t>
+              <a:t>3/22/2023</a:t>
             </a:fld>
             <a:endParaRPr lang="en-US"/>
           </a:p>
@@ -2668,7 +2669,7 @@
           <a:p>
             <a:fld id="{06B2AA2C-C863-4A3F-89A7-07245FFB4644}" type="datetimeFigureOut">
               <a:rPr lang="en-US" smtClean="0"/>
-              <a:t>3/21/2023</a:t>
+              <a:t>3/22/2023</a:t>
             </a:fld>
             <a:endParaRPr lang="en-US"/>
           </a:p>
@@ -2909,7 +2910,7 @@
           <a:p>
             <a:fld id="{06B2AA2C-C863-4A3F-89A7-07245FFB4644}" type="datetimeFigureOut">
               <a:rPr lang="en-US" smtClean="0"/>
-              <a:t>3/21/2023</a:t>
+              <a:t>3/22/2023</a:t>
             </a:fld>
             <a:endParaRPr lang="en-US"/>
           </a:p>
@@ -4535,6 +4536,2133 @@
 </p:sld>
 </file>
 
+<file path=ppt/slides/slide2.xml><?xml version="1.0" encoding="utf-8"?>
+<p:sld xmlns:a="http://schemas.openxmlformats.org/drawingml/2006/main" xmlns:r="http://schemas.openxmlformats.org/officeDocument/2006/relationships" xmlns:p="http://schemas.openxmlformats.org/presentationml/2006/main">
+  <p:cSld>
+    <p:spTree>
+      <p:nvGrpSpPr>
+        <p:cNvPr id="1" name=""/>
+        <p:cNvGrpSpPr/>
+        <p:nvPr/>
+      </p:nvGrpSpPr>
+      <p:grpSpPr>
+        <a:xfrm>
+          <a:off x="0" y="0"/>
+          <a:ext cx="0" cy="0"/>
+          <a:chOff x="0" y="0"/>
+          <a:chExt cx="0" cy="0"/>
+        </a:xfrm>
+      </p:grpSpPr>
+      <p:sp>
+        <p:nvSpPr>
+          <p:cNvPr id="4" name="Oval 3">
+            <a:extLst>
+              <a:ext uri="{FF2B5EF4-FFF2-40B4-BE49-F238E27FC236}">
+                <a16:creationId xmlns:a16="http://schemas.microsoft.com/office/drawing/2014/main" id="{8D10CB61-5C80-FC36-09C0-1843A58D4100}"/>
+              </a:ext>
+            </a:extLst>
+          </p:cNvPr>
+          <p:cNvSpPr/>
+          <p:nvPr/>
+        </p:nvSpPr>
+        <p:spPr>
+          <a:xfrm>
+            <a:off x="6467455" y="3096491"/>
+            <a:ext cx="439882" cy="436418"/>
+          </a:xfrm>
+          <a:prstGeom prst="ellipse">
+            <a:avLst/>
+          </a:prstGeom>
+          <a:solidFill>
+            <a:schemeClr val="accent6">
+              <a:lumMod val="60000"/>
+              <a:lumOff val="40000"/>
+            </a:schemeClr>
+          </a:solidFill>
+          <a:ln>
+            <a:noFill/>
+          </a:ln>
+        </p:spPr>
+        <p:style>
+          <a:lnRef idx="2">
+            <a:schemeClr val="accent1">
+              <a:shade val="50000"/>
+            </a:schemeClr>
+          </a:lnRef>
+          <a:fillRef idx="1">
+            <a:schemeClr val="accent1"/>
+          </a:fillRef>
+          <a:effectRef idx="0">
+            <a:schemeClr val="accent1"/>
+          </a:effectRef>
+          <a:fontRef idx="minor">
+            <a:schemeClr val="lt1"/>
+          </a:fontRef>
+        </p:style>
+        <p:txBody>
+          <a:bodyPr rtlCol="0" anchor="ctr"/>
+          <a:lstStyle/>
+          <a:p>
+            <a:pPr algn="ctr"/>
+            <a:r>
+              <a:rPr lang="en-US" sz="3600" i="1" dirty="0">
+                <a:solidFill>
+                  <a:schemeClr val="tx1"/>
+                </a:solidFill>
+              </a:rPr>
+              <a:t>~</a:t>
+            </a:r>
+          </a:p>
+        </p:txBody>
+      </p:sp>
+      <p:sp>
+        <p:nvSpPr>
+          <p:cNvPr id="6" name="TextBox 5">
+            <a:extLst>
+              <a:ext uri="{FF2B5EF4-FFF2-40B4-BE49-F238E27FC236}">
+                <a16:creationId xmlns:a16="http://schemas.microsoft.com/office/drawing/2014/main" id="{A2A239A0-C50A-9C2D-BAC2-1E897AB6443B}"/>
+              </a:ext>
+            </a:extLst>
+          </p:cNvPr>
+          <p:cNvSpPr txBox="1"/>
+          <p:nvPr/>
+        </p:nvSpPr>
+        <p:spPr>
+          <a:xfrm>
+            <a:off x="6158510" y="3587509"/>
+            <a:ext cx="1102324" cy="369332"/>
+          </a:xfrm>
+          <a:prstGeom prst="rect">
+            <a:avLst/>
+          </a:prstGeom>
+          <a:noFill/>
+        </p:spPr>
+        <p:txBody>
+          <a:bodyPr wrap="square" rtlCol="0">
+            <a:spAutoFit/>
+          </a:bodyPr>
+          <a:lstStyle/>
+          <a:p>
+            <a:r>
+              <a:rPr lang="en-US" dirty="0"/>
+              <a:t>Oscillator</a:t>
+            </a:r>
+          </a:p>
+        </p:txBody>
+      </p:sp>
+      <p:sp>
+        <p:nvSpPr>
+          <p:cNvPr id="8" name="Rectangle 7">
+            <a:extLst>
+              <a:ext uri="{FF2B5EF4-FFF2-40B4-BE49-F238E27FC236}">
+                <a16:creationId xmlns:a16="http://schemas.microsoft.com/office/drawing/2014/main" id="{8AE0C098-DD06-67B1-DCE3-4740F48DE377}"/>
+              </a:ext>
+            </a:extLst>
+          </p:cNvPr>
+          <p:cNvSpPr/>
+          <p:nvPr/>
+        </p:nvSpPr>
+        <p:spPr>
+          <a:xfrm>
+            <a:off x="2304164" y="2246986"/>
+            <a:ext cx="272782" cy="280554"/>
+          </a:xfrm>
+          <a:prstGeom prst="rect">
+            <a:avLst/>
+          </a:prstGeom>
+          <a:solidFill>
+            <a:schemeClr val="accent6">
+              <a:lumMod val="60000"/>
+              <a:lumOff val="40000"/>
+            </a:schemeClr>
+          </a:solidFill>
+          <a:ln>
+            <a:noFill/>
+          </a:ln>
+        </p:spPr>
+        <p:style>
+          <a:lnRef idx="2">
+            <a:schemeClr val="accent1">
+              <a:shade val="50000"/>
+            </a:schemeClr>
+          </a:lnRef>
+          <a:fillRef idx="1">
+            <a:schemeClr val="accent1"/>
+          </a:fillRef>
+          <a:effectRef idx="0">
+            <a:schemeClr val="accent1"/>
+          </a:effectRef>
+          <a:fontRef idx="minor">
+            <a:schemeClr val="lt1"/>
+          </a:fontRef>
+        </p:style>
+        <p:txBody>
+          <a:bodyPr rtlCol="0" anchor="ctr"/>
+          <a:lstStyle/>
+          <a:p>
+            <a:pPr algn="ctr"/>
+            <a:endParaRPr lang="en-US" dirty="0">
+              <a:solidFill>
+                <a:schemeClr val="tx1"/>
+              </a:solidFill>
+            </a:endParaRPr>
+          </a:p>
+        </p:txBody>
+      </p:sp>
+      <p:sp>
+        <p:nvSpPr>
+          <p:cNvPr id="9" name="TextBox 8">
+            <a:extLst>
+              <a:ext uri="{FF2B5EF4-FFF2-40B4-BE49-F238E27FC236}">
+                <a16:creationId xmlns:a16="http://schemas.microsoft.com/office/drawing/2014/main" id="{42D4EE32-183A-2E92-BE86-C1F725F04864}"/>
+              </a:ext>
+            </a:extLst>
+          </p:cNvPr>
+          <p:cNvSpPr txBox="1"/>
+          <p:nvPr/>
+        </p:nvSpPr>
+        <p:spPr>
+          <a:xfrm>
+            <a:off x="2304164" y="2652231"/>
+            <a:ext cx="1548246" cy="646331"/>
+          </a:xfrm>
+          <a:prstGeom prst="rect">
+            <a:avLst/>
+          </a:prstGeom>
+          <a:noFill/>
+        </p:spPr>
+        <p:txBody>
+          <a:bodyPr wrap="square" rtlCol="0">
+            <a:spAutoFit/>
+          </a:bodyPr>
+          <a:lstStyle/>
+          <a:p>
+            <a:r>
+              <a:rPr lang="en-US" dirty="0"/>
+              <a:t>[ … … … … ]</a:t>
+            </a:r>
+          </a:p>
+          <a:p>
+            <a:r>
+              <a:rPr lang="en-US" i="1" dirty="0"/>
+              <a:t>Output Buffer</a:t>
+            </a:r>
+          </a:p>
+        </p:txBody>
+      </p:sp>
+      <p:sp>
+        <p:nvSpPr>
+          <p:cNvPr id="10" name="Rectangle 9">
+            <a:extLst>
+              <a:ext uri="{FF2B5EF4-FFF2-40B4-BE49-F238E27FC236}">
+                <a16:creationId xmlns:a16="http://schemas.microsoft.com/office/drawing/2014/main" id="{C35F793C-BFB1-520C-27B9-2C3E365F99F7}"/>
+              </a:ext>
+            </a:extLst>
+          </p:cNvPr>
+          <p:cNvSpPr/>
+          <p:nvPr/>
+        </p:nvSpPr>
+        <p:spPr>
+          <a:xfrm>
+            <a:off x="2664382" y="2246986"/>
+            <a:ext cx="272782" cy="280554"/>
+          </a:xfrm>
+          <a:prstGeom prst="rect">
+            <a:avLst/>
+          </a:prstGeom>
+          <a:solidFill>
+            <a:schemeClr val="accent6">
+              <a:lumMod val="60000"/>
+              <a:lumOff val="40000"/>
+            </a:schemeClr>
+          </a:solidFill>
+          <a:ln>
+            <a:noFill/>
+          </a:ln>
+        </p:spPr>
+        <p:style>
+          <a:lnRef idx="2">
+            <a:schemeClr val="accent1">
+              <a:shade val="50000"/>
+            </a:schemeClr>
+          </a:lnRef>
+          <a:fillRef idx="1">
+            <a:schemeClr val="accent1"/>
+          </a:fillRef>
+          <a:effectRef idx="0">
+            <a:schemeClr val="accent1"/>
+          </a:effectRef>
+          <a:fontRef idx="minor">
+            <a:schemeClr val="lt1"/>
+          </a:fontRef>
+        </p:style>
+        <p:txBody>
+          <a:bodyPr rtlCol="0" anchor="ctr"/>
+          <a:lstStyle/>
+          <a:p>
+            <a:pPr algn="ctr"/>
+            <a:endParaRPr lang="en-US" dirty="0">
+              <a:solidFill>
+                <a:schemeClr val="tx1"/>
+              </a:solidFill>
+            </a:endParaRPr>
+          </a:p>
+        </p:txBody>
+      </p:sp>
+      <p:sp>
+        <p:nvSpPr>
+          <p:cNvPr id="11" name="Rectangle 10">
+            <a:extLst>
+              <a:ext uri="{FF2B5EF4-FFF2-40B4-BE49-F238E27FC236}">
+                <a16:creationId xmlns:a16="http://schemas.microsoft.com/office/drawing/2014/main" id="{925EEC5E-6478-8E9D-58CD-8652FBADD22A}"/>
+              </a:ext>
+            </a:extLst>
+          </p:cNvPr>
+          <p:cNvSpPr/>
+          <p:nvPr/>
+        </p:nvSpPr>
+        <p:spPr>
+          <a:xfrm>
+            <a:off x="3047137" y="2246986"/>
+            <a:ext cx="272782" cy="280554"/>
+          </a:xfrm>
+          <a:prstGeom prst="rect">
+            <a:avLst/>
+          </a:prstGeom>
+          <a:solidFill>
+            <a:schemeClr val="accent6">
+              <a:lumMod val="60000"/>
+              <a:lumOff val="40000"/>
+            </a:schemeClr>
+          </a:solidFill>
+          <a:ln>
+            <a:noFill/>
+          </a:ln>
+        </p:spPr>
+        <p:style>
+          <a:lnRef idx="2">
+            <a:schemeClr val="accent1">
+              <a:shade val="50000"/>
+            </a:schemeClr>
+          </a:lnRef>
+          <a:fillRef idx="1">
+            <a:schemeClr val="accent1"/>
+          </a:fillRef>
+          <a:effectRef idx="0">
+            <a:schemeClr val="accent1"/>
+          </a:effectRef>
+          <a:fontRef idx="minor">
+            <a:schemeClr val="lt1"/>
+          </a:fontRef>
+        </p:style>
+        <p:txBody>
+          <a:bodyPr rtlCol="0" anchor="ctr"/>
+          <a:lstStyle/>
+          <a:p>
+            <a:pPr algn="ctr"/>
+            <a:endParaRPr lang="en-US" dirty="0">
+              <a:solidFill>
+                <a:schemeClr val="tx1"/>
+              </a:solidFill>
+            </a:endParaRPr>
+          </a:p>
+        </p:txBody>
+      </p:sp>
+      <p:sp>
+        <p:nvSpPr>
+          <p:cNvPr id="12" name="Rectangle 11">
+            <a:extLst>
+              <a:ext uri="{FF2B5EF4-FFF2-40B4-BE49-F238E27FC236}">
+                <a16:creationId xmlns:a16="http://schemas.microsoft.com/office/drawing/2014/main" id="{7901AC03-A926-37B7-D74C-DC45D591AB19}"/>
+              </a:ext>
+            </a:extLst>
+          </p:cNvPr>
+          <p:cNvSpPr/>
+          <p:nvPr/>
+        </p:nvSpPr>
+        <p:spPr>
+          <a:xfrm>
+            <a:off x="3417746" y="2246986"/>
+            <a:ext cx="272782" cy="280554"/>
+          </a:xfrm>
+          <a:prstGeom prst="rect">
+            <a:avLst/>
+          </a:prstGeom>
+          <a:solidFill>
+            <a:schemeClr val="accent6">
+              <a:lumMod val="60000"/>
+              <a:lumOff val="40000"/>
+            </a:schemeClr>
+          </a:solidFill>
+          <a:ln>
+            <a:noFill/>
+          </a:ln>
+        </p:spPr>
+        <p:style>
+          <a:lnRef idx="2">
+            <a:schemeClr val="accent1">
+              <a:shade val="50000"/>
+            </a:schemeClr>
+          </a:lnRef>
+          <a:fillRef idx="1">
+            <a:schemeClr val="accent1"/>
+          </a:fillRef>
+          <a:effectRef idx="0">
+            <a:schemeClr val="accent1"/>
+          </a:effectRef>
+          <a:fontRef idx="minor">
+            <a:schemeClr val="lt1"/>
+          </a:fontRef>
+        </p:style>
+        <p:txBody>
+          <a:bodyPr rtlCol="0" anchor="ctr"/>
+          <a:lstStyle/>
+          <a:p>
+            <a:pPr algn="ctr"/>
+            <a:endParaRPr lang="en-US" dirty="0">
+              <a:solidFill>
+                <a:schemeClr val="tx1"/>
+              </a:solidFill>
+            </a:endParaRPr>
+          </a:p>
+        </p:txBody>
+      </p:sp>
+      <p:sp>
+        <p:nvSpPr>
+          <p:cNvPr id="13" name="Rectangle 12">
+            <a:extLst>
+              <a:ext uri="{FF2B5EF4-FFF2-40B4-BE49-F238E27FC236}">
+                <a16:creationId xmlns:a16="http://schemas.microsoft.com/office/drawing/2014/main" id="{1D39EDC9-6644-2EA0-B02A-B2276D170A3A}"/>
+              </a:ext>
+            </a:extLst>
+          </p:cNvPr>
+          <p:cNvSpPr/>
+          <p:nvPr/>
+        </p:nvSpPr>
+        <p:spPr>
+          <a:xfrm>
+            <a:off x="3777964" y="2246986"/>
+            <a:ext cx="272782" cy="280554"/>
+          </a:xfrm>
+          <a:prstGeom prst="rect">
+            <a:avLst/>
+          </a:prstGeom>
+          <a:solidFill>
+            <a:schemeClr val="accent6">
+              <a:lumMod val="60000"/>
+              <a:lumOff val="40000"/>
+            </a:schemeClr>
+          </a:solidFill>
+          <a:ln>
+            <a:noFill/>
+          </a:ln>
+        </p:spPr>
+        <p:style>
+          <a:lnRef idx="2">
+            <a:schemeClr val="accent1">
+              <a:shade val="50000"/>
+            </a:schemeClr>
+          </a:lnRef>
+          <a:fillRef idx="1">
+            <a:schemeClr val="accent1"/>
+          </a:fillRef>
+          <a:effectRef idx="0">
+            <a:schemeClr val="accent1"/>
+          </a:effectRef>
+          <a:fontRef idx="minor">
+            <a:schemeClr val="lt1"/>
+          </a:fontRef>
+        </p:style>
+        <p:txBody>
+          <a:bodyPr rtlCol="0" anchor="ctr"/>
+          <a:lstStyle/>
+          <a:p>
+            <a:pPr algn="ctr"/>
+            <a:endParaRPr lang="en-US" dirty="0">
+              <a:solidFill>
+                <a:schemeClr val="tx1"/>
+              </a:solidFill>
+            </a:endParaRPr>
+          </a:p>
+        </p:txBody>
+      </p:sp>
+      <p:cxnSp>
+        <p:nvCxnSpPr>
+          <p:cNvPr id="17" name="Straight Arrow Connector 16">
+            <a:extLst>
+              <a:ext uri="{FF2B5EF4-FFF2-40B4-BE49-F238E27FC236}">
+                <a16:creationId xmlns:a16="http://schemas.microsoft.com/office/drawing/2014/main" id="{EA5450BE-EA59-6631-D1F8-1C8CD0042D1E}"/>
+              </a:ext>
+            </a:extLst>
+          </p:cNvPr>
+          <p:cNvCxnSpPr>
+            <a:cxnSpLocks/>
+          </p:cNvCxnSpPr>
+          <p:nvPr/>
+        </p:nvCxnSpPr>
+        <p:spPr>
+          <a:xfrm>
+            <a:off x="1527464" y="2376872"/>
+            <a:ext cx="776700" cy="0"/>
+          </a:xfrm>
+          <a:prstGeom prst="straightConnector1">
+            <a:avLst/>
+          </a:prstGeom>
+          <a:ln>
+            <a:tailEnd type="triangle"/>
+          </a:ln>
+        </p:spPr>
+        <p:style>
+          <a:lnRef idx="1">
+            <a:schemeClr val="accent1"/>
+          </a:lnRef>
+          <a:fillRef idx="0">
+            <a:schemeClr val="accent1"/>
+          </a:fillRef>
+          <a:effectRef idx="0">
+            <a:schemeClr val="accent1"/>
+          </a:effectRef>
+          <a:fontRef idx="minor">
+            <a:schemeClr val="tx1"/>
+          </a:fontRef>
+        </p:style>
+      </p:cxnSp>
+      <p:sp>
+        <p:nvSpPr>
+          <p:cNvPr id="19" name="Rectangle 18">
+            <a:extLst>
+              <a:ext uri="{FF2B5EF4-FFF2-40B4-BE49-F238E27FC236}">
+                <a16:creationId xmlns:a16="http://schemas.microsoft.com/office/drawing/2014/main" id="{FD5CFB49-28A4-D19C-50F0-BFDC5B011344}"/>
+              </a:ext>
+            </a:extLst>
+          </p:cNvPr>
+          <p:cNvSpPr/>
+          <p:nvPr/>
+        </p:nvSpPr>
+        <p:spPr>
+          <a:xfrm>
+            <a:off x="4896719" y="2246986"/>
+            <a:ext cx="724763" cy="280554"/>
+          </a:xfrm>
+          <a:prstGeom prst="rect">
+            <a:avLst/>
+          </a:prstGeom>
+          <a:solidFill>
+            <a:schemeClr val="accent6">
+              <a:lumMod val="60000"/>
+              <a:lumOff val="40000"/>
+            </a:schemeClr>
+          </a:solidFill>
+          <a:ln>
+            <a:noFill/>
+          </a:ln>
+        </p:spPr>
+        <p:style>
+          <a:lnRef idx="2">
+            <a:schemeClr val="accent1">
+              <a:shade val="50000"/>
+            </a:schemeClr>
+          </a:lnRef>
+          <a:fillRef idx="1">
+            <a:schemeClr val="accent1"/>
+          </a:fillRef>
+          <a:effectRef idx="0">
+            <a:schemeClr val="accent1"/>
+          </a:effectRef>
+          <a:fontRef idx="minor">
+            <a:schemeClr val="lt1"/>
+          </a:fontRef>
+        </p:style>
+        <p:txBody>
+          <a:bodyPr rtlCol="0" anchor="ctr"/>
+          <a:lstStyle/>
+          <a:p>
+            <a:pPr algn="ctr"/>
+            <a:r>
+              <a:rPr lang="en-US" dirty="0">
+                <a:solidFill>
+                  <a:schemeClr val="tx1"/>
+                </a:solidFill>
+              </a:rPr>
+              <a:t>DAC</a:t>
+            </a:r>
+          </a:p>
+        </p:txBody>
+      </p:sp>
+      <p:cxnSp>
+        <p:nvCxnSpPr>
+          <p:cNvPr id="21" name="Straight Arrow Connector 20">
+            <a:extLst>
+              <a:ext uri="{FF2B5EF4-FFF2-40B4-BE49-F238E27FC236}">
+                <a16:creationId xmlns:a16="http://schemas.microsoft.com/office/drawing/2014/main" id="{97038DE8-DBD3-DF2F-0314-925AA144FEFF}"/>
+              </a:ext>
+            </a:extLst>
+          </p:cNvPr>
+          <p:cNvCxnSpPr>
+            <a:stCxn id="13" idx="3"/>
+            <a:endCxn id="19" idx="1"/>
+          </p:cNvCxnSpPr>
+          <p:nvPr/>
+        </p:nvCxnSpPr>
+        <p:spPr>
+          <a:xfrm>
+            <a:off x="4050746" y="2387263"/>
+            <a:ext cx="845973" cy="0"/>
+          </a:xfrm>
+          <a:prstGeom prst="straightConnector1">
+            <a:avLst/>
+          </a:prstGeom>
+          <a:ln>
+            <a:tailEnd type="triangle"/>
+          </a:ln>
+        </p:spPr>
+        <p:style>
+          <a:lnRef idx="1">
+            <a:schemeClr val="accent1"/>
+          </a:lnRef>
+          <a:fillRef idx="0">
+            <a:schemeClr val="accent1"/>
+          </a:fillRef>
+          <a:effectRef idx="0">
+            <a:schemeClr val="accent1"/>
+          </a:effectRef>
+          <a:fontRef idx="minor">
+            <a:schemeClr val="tx1"/>
+          </a:fontRef>
+        </p:style>
+      </p:cxnSp>
+      <p:sp>
+        <p:nvSpPr>
+          <p:cNvPr id="22" name="Oval 21">
+            <a:extLst>
+              <a:ext uri="{FF2B5EF4-FFF2-40B4-BE49-F238E27FC236}">
+                <a16:creationId xmlns:a16="http://schemas.microsoft.com/office/drawing/2014/main" id="{702494DF-9A24-E1C6-4007-196EC2727D9A}"/>
+              </a:ext>
+            </a:extLst>
+          </p:cNvPr>
+          <p:cNvSpPr/>
+          <p:nvPr/>
+        </p:nvSpPr>
+        <p:spPr>
+          <a:xfrm>
+            <a:off x="6467455" y="2169054"/>
+            <a:ext cx="439882" cy="436418"/>
+          </a:xfrm>
+          <a:prstGeom prst="ellipse">
+            <a:avLst/>
+          </a:prstGeom>
+          <a:solidFill>
+            <a:schemeClr val="accent6">
+              <a:lumMod val="60000"/>
+              <a:lumOff val="40000"/>
+            </a:schemeClr>
+          </a:solidFill>
+          <a:ln>
+            <a:noFill/>
+          </a:ln>
+        </p:spPr>
+        <p:style>
+          <a:lnRef idx="2">
+            <a:schemeClr val="accent1">
+              <a:shade val="50000"/>
+            </a:schemeClr>
+          </a:lnRef>
+          <a:fillRef idx="1">
+            <a:schemeClr val="accent1"/>
+          </a:fillRef>
+          <a:effectRef idx="0">
+            <a:schemeClr val="accent1"/>
+          </a:effectRef>
+          <a:fontRef idx="minor">
+            <a:schemeClr val="lt1"/>
+          </a:fontRef>
+        </p:style>
+        <p:txBody>
+          <a:bodyPr rtlCol="0" anchor="ctr"/>
+          <a:lstStyle/>
+          <a:p>
+            <a:pPr algn="ctr"/>
+            <a:r>
+              <a:rPr lang="en-US" sz="3600" i="1" dirty="0">
+                <a:solidFill>
+                  <a:schemeClr val="tx1"/>
+                </a:solidFill>
+              </a:rPr>
+              <a:t>x</a:t>
+            </a:r>
+          </a:p>
+        </p:txBody>
+      </p:sp>
+      <p:cxnSp>
+        <p:nvCxnSpPr>
+          <p:cNvPr id="24" name="Straight Arrow Connector 23">
+            <a:extLst>
+              <a:ext uri="{FF2B5EF4-FFF2-40B4-BE49-F238E27FC236}">
+                <a16:creationId xmlns:a16="http://schemas.microsoft.com/office/drawing/2014/main" id="{1DDAF7F6-5CE0-46F0-A93F-B531AD6652F3}"/>
+              </a:ext>
+            </a:extLst>
+          </p:cNvPr>
+          <p:cNvCxnSpPr>
+            <a:cxnSpLocks/>
+            <a:stCxn id="19" idx="3"/>
+            <a:endCxn id="22" idx="2"/>
+          </p:cNvCxnSpPr>
+          <p:nvPr/>
+        </p:nvCxnSpPr>
+        <p:spPr>
+          <a:xfrm>
+            <a:off x="5621482" y="2387263"/>
+            <a:ext cx="845973" cy="0"/>
+          </a:xfrm>
+          <a:prstGeom prst="straightConnector1">
+            <a:avLst/>
+          </a:prstGeom>
+          <a:ln>
+            <a:tailEnd type="triangle"/>
+          </a:ln>
+        </p:spPr>
+        <p:style>
+          <a:lnRef idx="1">
+            <a:schemeClr val="accent1"/>
+          </a:lnRef>
+          <a:fillRef idx="0">
+            <a:schemeClr val="accent1"/>
+          </a:fillRef>
+          <a:effectRef idx="0">
+            <a:schemeClr val="accent1"/>
+          </a:effectRef>
+          <a:fontRef idx="minor">
+            <a:schemeClr val="tx1"/>
+          </a:fontRef>
+        </p:style>
+      </p:cxnSp>
+      <p:cxnSp>
+        <p:nvCxnSpPr>
+          <p:cNvPr id="28" name="Straight Arrow Connector 27">
+            <a:extLst>
+              <a:ext uri="{FF2B5EF4-FFF2-40B4-BE49-F238E27FC236}">
+                <a16:creationId xmlns:a16="http://schemas.microsoft.com/office/drawing/2014/main" id="{7466C179-9B26-A87B-8936-4C29E1C9C5FF}"/>
+              </a:ext>
+            </a:extLst>
+          </p:cNvPr>
+          <p:cNvCxnSpPr>
+            <a:stCxn id="4" idx="0"/>
+            <a:endCxn id="22" idx="4"/>
+          </p:cNvCxnSpPr>
+          <p:nvPr/>
+        </p:nvCxnSpPr>
+        <p:spPr>
+          <a:xfrm flipV="1">
+            <a:off x="6687396" y="2605472"/>
+            <a:ext cx="0" cy="491019"/>
+          </a:xfrm>
+          <a:prstGeom prst="straightConnector1">
+            <a:avLst/>
+          </a:prstGeom>
+          <a:ln>
+            <a:tailEnd type="triangle"/>
+          </a:ln>
+        </p:spPr>
+        <p:style>
+          <a:lnRef idx="1">
+            <a:schemeClr val="accent1"/>
+          </a:lnRef>
+          <a:fillRef idx="0">
+            <a:schemeClr val="accent1"/>
+          </a:fillRef>
+          <a:effectRef idx="0">
+            <a:schemeClr val="accent1"/>
+          </a:effectRef>
+          <a:fontRef idx="minor">
+            <a:schemeClr val="tx1"/>
+          </a:fontRef>
+        </p:style>
+      </p:cxnSp>
+      <p:sp>
+        <p:nvSpPr>
+          <p:cNvPr id="29" name="Freeform: Shape 28">
+            <a:extLst>
+              <a:ext uri="{FF2B5EF4-FFF2-40B4-BE49-F238E27FC236}">
+                <a16:creationId xmlns:a16="http://schemas.microsoft.com/office/drawing/2014/main" id="{6D454376-EA35-919A-AC8C-7FF1301F12EB}"/>
+              </a:ext>
+            </a:extLst>
+          </p:cNvPr>
+          <p:cNvSpPr/>
+          <p:nvPr/>
+        </p:nvSpPr>
+        <p:spPr>
+          <a:xfrm>
+            <a:off x="5022284" y="3384803"/>
+            <a:ext cx="473632" cy="296212"/>
+          </a:xfrm>
+          <a:custGeom>
+            <a:avLst/>
+            <a:gdLst>
+              <a:gd name="connsiteX0" fmla="*/ 0 w 1059873"/>
+              <a:gd name="connsiteY0" fmla="*/ 192306 h 547588"/>
+              <a:gd name="connsiteX1" fmla="*/ 332509 w 1059873"/>
+              <a:gd name="connsiteY1" fmla="*/ 15661 h 547588"/>
+              <a:gd name="connsiteX2" fmla="*/ 581891 w 1059873"/>
+              <a:gd name="connsiteY2" fmla="*/ 545597 h 547588"/>
+              <a:gd name="connsiteX3" fmla="*/ 820882 w 1059873"/>
+              <a:gd name="connsiteY3" fmla="*/ 202697 h 547588"/>
+              <a:gd name="connsiteX4" fmla="*/ 1059873 w 1059873"/>
+              <a:gd name="connsiteY4" fmla="*/ 368952 h 547588"/>
+            </a:gdLst>
+            <a:ahLst/>
+            <a:cxnLst>
+              <a:cxn ang="0">
+                <a:pos x="connsiteX0" y="connsiteY0"/>
+              </a:cxn>
+              <a:cxn ang="0">
+                <a:pos x="connsiteX1" y="connsiteY1"/>
+              </a:cxn>
+              <a:cxn ang="0">
+                <a:pos x="connsiteX2" y="connsiteY2"/>
+              </a:cxn>
+              <a:cxn ang="0">
+                <a:pos x="connsiteX3" y="connsiteY3"/>
+              </a:cxn>
+              <a:cxn ang="0">
+                <a:pos x="connsiteX4" y="connsiteY4"/>
+              </a:cxn>
+            </a:cxnLst>
+            <a:rect l="l" t="t" r="r" b="b"/>
+            <a:pathLst>
+              <a:path w="1059873" h="547588">
+                <a:moveTo>
+                  <a:pt x="0" y="192306"/>
+                </a:moveTo>
+                <a:cubicBezTo>
+                  <a:pt x="117763" y="74542"/>
+                  <a:pt x="235527" y="-43221"/>
+                  <a:pt x="332509" y="15661"/>
+                </a:cubicBezTo>
+                <a:cubicBezTo>
+                  <a:pt x="429491" y="74543"/>
+                  <a:pt x="500496" y="514424"/>
+                  <a:pt x="581891" y="545597"/>
+                </a:cubicBezTo>
+                <a:cubicBezTo>
+                  <a:pt x="663286" y="576770"/>
+                  <a:pt x="741218" y="232138"/>
+                  <a:pt x="820882" y="202697"/>
+                </a:cubicBezTo>
+                <a:cubicBezTo>
+                  <a:pt x="900546" y="173256"/>
+                  <a:pt x="1052946" y="363756"/>
+                  <a:pt x="1059873" y="368952"/>
+                </a:cubicBezTo>
+              </a:path>
+            </a:pathLst>
+          </a:custGeom>
+          <a:noFill/>
+        </p:spPr>
+        <p:style>
+          <a:lnRef idx="2">
+            <a:schemeClr val="accent1">
+              <a:shade val="50000"/>
+            </a:schemeClr>
+          </a:lnRef>
+          <a:fillRef idx="1">
+            <a:schemeClr val="accent1"/>
+          </a:fillRef>
+          <a:effectRef idx="0">
+            <a:schemeClr val="accent1"/>
+          </a:effectRef>
+          <a:fontRef idx="minor">
+            <a:schemeClr val="lt1"/>
+          </a:fontRef>
+        </p:style>
+        <p:txBody>
+          <a:bodyPr rtlCol="0" anchor="ctr"/>
+          <a:lstStyle/>
+          <a:p>
+            <a:pPr algn="ctr"/>
+            <a:endParaRPr lang="en-US"/>
+          </a:p>
+        </p:txBody>
+      </p:sp>
+      <p:sp>
+        <p:nvSpPr>
+          <p:cNvPr id="31" name="TextBox 30">
+            <a:extLst>
+              <a:ext uri="{FF2B5EF4-FFF2-40B4-BE49-F238E27FC236}">
+                <a16:creationId xmlns:a16="http://schemas.microsoft.com/office/drawing/2014/main" id="{2D56B6C0-5833-476A-424A-4CDF554D5F50}"/>
+              </a:ext>
+            </a:extLst>
+          </p:cNvPr>
+          <p:cNvSpPr txBox="1"/>
+          <p:nvPr/>
+        </p:nvSpPr>
+        <p:spPr>
+          <a:xfrm>
+            <a:off x="4649458" y="2602257"/>
+            <a:ext cx="1265093" cy="369332"/>
+          </a:xfrm>
+          <a:prstGeom prst="rect">
+            <a:avLst/>
+          </a:prstGeom>
+          <a:noFill/>
+        </p:spPr>
+        <p:txBody>
+          <a:bodyPr wrap="square">
+            <a:spAutoFit/>
+          </a:bodyPr>
+          <a:lstStyle/>
+          <a:p>
+            <a:r>
+              <a:rPr lang="en-US" dirty="0"/>
+              <a:t>Re. + Im.(j)</a:t>
+            </a:r>
+          </a:p>
+        </p:txBody>
+      </p:sp>
+      <p:cxnSp>
+        <p:nvCxnSpPr>
+          <p:cNvPr id="33" name="Straight Arrow Connector 32">
+            <a:extLst>
+              <a:ext uri="{FF2B5EF4-FFF2-40B4-BE49-F238E27FC236}">
+                <a16:creationId xmlns:a16="http://schemas.microsoft.com/office/drawing/2014/main" id="{C9D5B520-0ADE-BC0F-FFB9-64A40F3D7D20}"/>
+              </a:ext>
+            </a:extLst>
+          </p:cNvPr>
+          <p:cNvCxnSpPr>
+            <a:stCxn id="31" idx="2"/>
+          </p:cNvCxnSpPr>
+          <p:nvPr/>
+        </p:nvCxnSpPr>
+        <p:spPr>
+          <a:xfrm flipH="1">
+            <a:off x="5282004" y="2971589"/>
+            <a:ext cx="1" cy="343111"/>
+          </a:xfrm>
+          <a:prstGeom prst="straightConnector1">
+            <a:avLst/>
+          </a:prstGeom>
+          <a:ln>
+            <a:tailEnd type="triangle"/>
+          </a:ln>
+        </p:spPr>
+        <p:style>
+          <a:lnRef idx="1">
+            <a:schemeClr val="accent1"/>
+          </a:lnRef>
+          <a:fillRef idx="0">
+            <a:schemeClr val="accent1"/>
+          </a:fillRef>
+          <a:effectRef idx="0">
+            <a:schemeClr val="accent1"/>
+          </a:effectRef>
+          <a:fontRef idx="minor">
+            <a:schemeClr val="tx1"/>
+          </a:fontRef>
+        </p:style>
+      </p:cxnSp>
+      <p:sp>
+        <p:nvSpPr>
+          <p:cNvPr id="34" name="TextBox 33">
+            <a:extLst>
+              <a:ext uri="{FF2B5EF4-FFF2-40B4-BE49-F238E27FC236}">
+                <a16:creationId xmlns:a16="http://schemas.microsoft.com/office/drawing/2014/main" id="{829A6652-5294-32F0-E478-EBFBA338D404}"/>
+              </a:ext>
+            </a:extLst>
+          </p:cNvPr>
+          <p:cNvSpPr txBox="1"/>
+          <p:nvPr/>
+        </p:nvSpPr>
+        <p:spPr>
+          <a:xfrm>
+            <a:off x="5986679" y="1522723"/>
+            <a:ext cx="1590242" cy="646331"/>
+          </a:xfrm>
+          <a:prstGeom prst="rect">
+            <a:avLst/>
+          </a:prstGeom>
+          <a:noFill/>
+        </p:spPr>
+        <p:txBody>
+          <a:bodyPr wrap="square" rtlCol="0">
+            <a:spAutoFit/>
+          </a:bodyPr>
+          <a:lstStyle/>
+          <a:p>
+            <a:r>
+              <a:rPr lang="en-US" dirty="0"/>
+              <a:t>Up conversion </a:t>
+            </a:r>
+            <a:r>
+              <a:rPr lang="en-US" i="1" dirty="0"/>
+              <a:t>fc </a:t>
+            </a:r>
+            <a:r>
+              <a:rPr lang="en-US" dirty="0"/>
+              <a:t>(ISM Band)</a:t>
+            </a:r>
+          </a:p>
+        </p:txBody>
+      </p:sp>
+      <p:sp>
+        <p:nvSpPr>
+          <p:cNvPr id="35" name="Rectangle 34">
+            <a:extLst>
+              <a:ext uri="{FF2B5EF4-FFF2-40B4-BE49-F238E27FC236}">
+                <a16:creationId xmlns:a16="http://schemas.microsoft.com/office/drawing/2014/main" id="{374B47F0-7416-8F2E-C53B-6E287D4F4441}"/>
+              </a:ext>
+            </a:extLst>
+          </p:cNvPr>
+          <p:cNvSpPr/>
+          <p:nvPr/>
+        </p:nvSpPr>
+        <p:spPr>
+          <a:xfrm>
+            <a:off x="7702247" y="2246986"/>
+            <a:ext cx="724763" cy="280554"/>
+          </a:xfrm>
+          <a:prstGeom prst="rect">
+            <a:avLst/>
+          </a:prstGeom>
+          <a:solidFill>
+            <a:schemeClr val="accent6">
+              <a:lumMod val="60000"/>
+              <a:lumOff val="40000"/>
+            </a:schemeClr>
+          </a:solidFill>
+          <a:ln>
+            <a:noFill/>
+          </a:ln>
+        </p:spPr>
+        <p:style>
+          <a:lnRef idx="2">
+            <a:schemeClr val="accent1">
+              <a:shade val="50000"/>
+            </a:schemeClr>
+          </a:lnRef>
+          <a:fillRef idx="1">
+            <a:schemeClr val="accent1"/>
+          </a:fillRef>
+          <a:effectRef idx="0">
+            <a:schemeClr val="accent1"/>
+          </a:effectRef>
+          <a:fontRef idx="minor">
+            <a:schemeClr val="lt1"/>
+          </a:fontRef>
+        </p:style>
+        <p:txBody>
+          <a:bodyPr rtlCol="0" anchor="ctr"/>
+          <a:lstStyle/>
+          <a:p>
+            <a:pPr algn="ctr"/>
+            <a:r>
+              <a:rPr lang="en-US" dirty="0">
+                <a:solidFill>
+                  <a:schemeClr val="tx1"/>
+                </a:solidFill>
+              </a:rPr>
+              <a:t>Filter</a:t>
+            </a:r>
+          </a:p>
+        </p:txBody>
+      </p:sp>
+      <p:cxnSp>
+        <p:nvCxnSpPr>
+          <p:cNvPr id="37" name="Straight Arrow Connector 36">
+            <a:extLst>
+              <a:ext uri="{FF2B5EF4-FFF2-40B4-BE49-F238E27FC236}">
+                <a16:creationId xmlns:a16="http://schemas.microsoft.com/office/drawing/2014/main" id="{04E7CCCB-0F78-7682-33D0-9D8B1B47FCC9}"/>
+              </a:ext>
+            </a:extLst>
+          </p:cNvPr>
+          <p:cNvCxnSpPr>
+            <a:stCxn id="22" idx="6"/>
+            <a:endCxn id="35" idx="1"/>
+          </p:cNvCxnSpPr>
+          <p:nvPr/>
+        </p:nvCxnSpPr>
+        <p:spPr>
+          <a:xfrm>
+            <a:off x="6907337" y="2387263"/>
+            <a:ext cx="794910" cy="0"/>
+          </a:xfrm>
+          <a:prstGeom prst="straightConnector1">
+            <a:avLst/>
+          </a:prstGeom>
+          <a:ln>
+            <a:tailEnd type="triangle"/>
+          </a:ln>
+        </p:spPr>
+        <p:style>
+          <a:lnRef idx="1">
+            <a:schemeClr val="accent1"/>
+          </a:lnRef>
+          <a:fillRef idx="0">
+            <a:schemeClr val="accent1"/>
+          </a:fillRef>
+          <a:effectRef idx="0">
+            <a:schemeClr val="accent1"/>
+          </a:effectRef>
+          <a:fontRef idx="minor">
+            <a:schemeClr val="tx1"/>
+          </a:fontRef>
+        </p:style>
+      </p:cxnSp>
+      <p:cxnSp>
+        <p:nvCxnSpPr>
+          <p:cNvPr id="41" name="Straight Arrow Connector 40">
+            <a:extLst>
+              <a:ext uri="{FF2B5EF4-FFF2-40B4-BE49-F238E27FC236}">
+                <a16:creationId xmlns:a16="http://schemas.microsoft.com/office/drawing/2014/main" id="{A1627CDA-836A-5DF4-DC73-AC85D8E7856E}"/>
+              </a:ext>
+            </a:extLst>
+          </p:cNvPr>
+          <p:cNvCxnSpPr>
+            <a:stCxn id="35" idx="3"/>
+          </p:cNvCxnSpPr>
+          <p:nvPr/>
+        </p:nvCxnSpPr>
+        <p:spPr>
+          <a:xfrm flipV="1">
+            <a:off x="8427010" y="2376872"/>
+            <a:ext cx="1018326" cy="10391"/>
+          </a:xfrm>
+          <a:prstGeom prst="straightConnector1">
+            <a:avLst/>
+          </a:prstGeom>
+          <a:ln>
+            <a:tailEnd type="triangle"/>
+          </a:ln>
+        </p:spPr>
+        <p:style>
+          <a:lnRef idx="1">
+            <a:schemeClr val="accent1"/>
+          </a:lnRef>
+          <a:fillRef idx="0">
+            <a:schemeClr val="accent1"/>
+          </a:fillRef>
+          <a:effectRef idx="0">
+            <a:schemeClr val="accent1"/>
+          </a:effectRef>
+          <a:fontRef idx="minor">
+            <a:schemeClr val="tx1"/>
+          </a:fontRef>
+        </p:style>
+      </p:cxnSp>
+      <p:sp>
+        <p:nvSpPr>
+          <p:cNvPr id="43" name="Rectangle 42">
+            <a:extLst>
+              <a:ext uri="{FF2B5EF4-FFF2-40B4-BE49-F238E27FC236}">
+                <a16:creationId xmlns:a16="http://schemas.microsoft.com/office/drawing/2014/main" id="{DD5DCCB3-916C-0BF5-0E46-2E59BDA0E555}"/>
+              </a:ext>
+            </a:extLst>
+          </p:cNvPr>
+          <p:cNvSpPr/>
+          <p:nvPr/>
+        </p:nvSpPr>
+        <p:spPr>
+          <a:xfrm>
+            <a:off x="9547873" y="2005900"/>
+            <a:ext cx="67118" cy="646331"/>
+          </a:xfrm>
+          <a:prstGeom prst="rect">
+            <a:avLst/>
+          </a:prstGeom>
+          <a:solidFill>
+            <a:schemeClr val="accent6">
+              <a:lumMod val="60000"/>
+              <a:lumOff val="40000"/>
+            </a:schemeClr>
+          </a:solidFill>
+          <a:ln>
+            <a:noFill/>
+          </a:ln>
+        </p:spPr>
+        <p:style>
+          <a:lnRef idx="2">
+            <a:schemeClr val="accent1">
+              <a:shade val="50000"/>
+            </a:schemeClr>
+          </a:lnRef>
+          <a:fillRef idx="1">
+            <a:schemeClr val="accent1"/>
+          </a:fillRef>
+          <a:effectRef idx="0">
+            <a:schemeClr val="accent1"/>
+          </a:effectRef>
+          <a:fontRef idx="minor">
+            <a:schemeClr val="lt1"/>
+          </a:fontRef>
+        </p:style>
+        <p:txBody>
+          <a:bodyPr rtlCol="0" anchor="ctr"/>
+          <a:lstStyle/>
+          <a:p>
+            <a:pPr algn="ctr"/>
+            <a:endParaRPr lang="en-US" dirty="0">
+              <a:solidFill>
+                <a:schemeClr val="tx1"/>
+              </a:solidFill>
+            </a:endParaRPr>
+          </a:p>
+        </p:txBody>
+      </p:sp>
+      <p:sp>
+        <p:nvSpPr>
+          <p:cNvPr id="44" name="Isosceles Triangle 43">
+            <a:extLst>
+              <a:ext uri="{FF2B5EF4-FFF2-40B4-BE49-F238E27FC236}">
+                <a16:creationId xmlns:a16="http://schemas.microsoft.com/office/drawing/2014/main" id="{ABE43C77-5A81-6604-243F-854F5A570AC7}"/>
+              </a:ext>
+            </a:extLst>
+          </p:cNvPr>
+          <p:cNvSpPr/>
+          <p:nvPr/>
+        </p:nvSpPr>
+        <p:spPr>
+          <a:xfrm rot="10800000">
+            <a:off x="9396781" y="1725346"/>
+            <a:ext cx="363682" cy="342900"/>
+          </a:xfrm>
+          <a:prstGeom prst="triangle">
+            <a:avLst/>
+          </a:prstGeom>
+          <a:solidFill>
+            <a:schemeClr val="accent6">
+              <a:lumMod val="60000"/>
+              <a:lumOff val="40000"/>
+            </a:schemeClr>
+          </a:solidFill>
+          <a:ln>
+            <a:noFill/>
+          </a:ln>
+        </p:spPr>
+        <p:style>
+          <a:lnRef idx="2">
+            <a:schemeClr val="accent1">
+              <a:shade val="50000"/>
+            </a:schemeClr>
+          </a:lnRef>
+          <a:fillRef idx="1">
+            <a:schemeClr val="accent1"/>
+          </a:fillRef>
+          <a:effectRef idx="0">
+            <a:schemeClr val="accent1"/>
+          </a:effectRef>
+          <a:fontRef idx="minor">
+            <a:schemeClr val="lt1"/>
+          </a:fontRef>
+        </p:style>
+        <p:txBody>
+          <a:bodyPr rtlCol="0" anchor="ctr"/>
+          <a:lstStyle/>
+          <a:p>
+            <a:pPr algn="ctr"/>
+            <a:endParaRPr lang="en-US"/>
+          </a:p>
+        </p:txBody>
+      </p:sp>
+      <p:sp>
+        <p:nvSpPr>
+          <p:cNvPr id="45" name="TextBox 44">
+            <a:extLst>
+              <a:ext uri="{FF2B5EF4-FFF2-40B4-BE49-F238E27FC236}">
+                <a16:creationId xmlns:a16="http://schemas.microsoft.com/office/drawing/2014/main" id="{1E8DDBC4-2CB3-E1AF-488E-2DA249A8AA14}"/>
+              </a:ext>
+            </a:extLst>
+          </p:cNvPr>
+          <p:cNvSpPr txBox="1"/>
+          <p:nvPr/>
+        </p:nvSpPr>
+        <p:spPr>
+          <a:xfrm>
+            <a:off x="9043066" y="2695888"/>
+            <a:ext cx="1590242" cy="369332"/>
+          </a:xfrm>
+          <a:prstGeom prst="rect">
+            <a:avLst/>
+          </a:prstGeom>
+          <a:noFill/>
+        </p:spPr>
+        <p:txBody>
+          <a:bodyPr wrap="square" rtlCol="0">
+            <a:spAutoFit/>
+          </a:bodyPr>
+          <a:lstStyle/>
+          <a:p>
+            <a:r>
+              <a:rPr lang="en-US" dirty="0"/>
+              <a:t>Tx Antenna</a:t>
+            </a:r>
+          </a:p>
+        </p:txBody>
+      </p:sp>
+      <p:sp>
+        <p:nvSpPr>
+          <p:cNvPr id="47" name="Freeform: Shape 46">
+            <a:extLst>
+              <a:ext uri="{FF2B5EF4-FFF2-40B4-BE49-F238E27FC236}">
+                <a16:creationId xmlns:a16="http://schemas.microsoft.com/office/drawing/2014/main" id="{9914AE17-4941-72C4-7B70-90FC5AF61FA9}"/>
+              </a:ext>
+            </a:extLst>
+          </p:cNvPr>
+          <p:cNvSpPr/>
+          <p:nvPr/>
+        </p:nvSpPr>
+        <p:spPr>
+          <a:xfrm>
+            <a:off x="7647692" y="2652231"/>
+            <a:ext cx="779318" cy="384475"/>
+          </a:xfrm>
+          <a:custGeom>
+            <a:avLst/>
+            <a:gdLst>
+              <a:gd name="connsiteX0" fmla="*/ 0 w 779318"/>
+              <a:gd name="connsiteY0" fmla="*/ 384475 h 384475"/>
+              <a:gd name="connsiteX1" fmla="*/ 405245 w 779318"/>
+              <a:gd name="connsiteY1" fmla="*/ 11 h 384475"/>
+              <a:gd name="connsiteX2" fmla="*/ 779318 w 779318"/>
+              <a:gd name="connsiteY2" fmla="*/ 374084 h 384475"/>
+            </a:gdLst>
+            <a:ahLst/>
+            <a:cxnLst>
+              <a:cxn ang="0">
+                <a:pos x="connsiteX0" y="connsiteY0"/>
+              </a:cxn>
+              <a:cxn ang="0">
+                <a:pos x="connsiteX1" y="connsiteY1"/>
+              </a:cxn>
+              <a:cxn ang="0">
+                <a:pos x="connsiteX2" y="connsiteY2"/>
+              </a:cxn>
+            </a:cxnLst>
+            <a:rect l="l" t="t" r="r" b="b"/>
+            <a:pathLst>
+              <a:path w="779318" h="384475">
+                <a:moveTo>
+                  <a:pt x="0" y="384475"/>
+                </a:moveTo>
+                <a:cubicBezTo>
+                  <a:pt x="137679" y="193109"/>
+                  <a:pt x="275359" y="1743"/>
+                  <a:pt x="405245" y="11"/>
+                </a:cubicBezTo>
+                <a:cubicBezTo>
+                  <a:pt x="535131" y="-1721"/>
+                  <a:pt x="657224" y="186181"/>
+                  <a:pt x="779318" y="374084"/>
+                </a:cubicBezTo>
+              </a:path>
+            </a:pathLst>
+          </a:custGeom>
+          <a:noFill/>
+        </p:spPr>
+        <p:style>
+          <a:lnRef idx="2">
+            <a:schemeClr val="accent1">
+              <a:shade val="50000"/>
+            </a:schemeClr>
+          </a:lnRef>
+          <a:fillRef idx="1">
+            <a:schemeClr val="accent1"/>
+          </a:fillRef>
+          <a:effectRef idx="0">
+            <a:schemeClr val="accent1"/>
+          </a:effectRef>
+          <a:fontRef idx="minor">
+            <a:schemeClr val="lt1"/>
+          </a:fontRef>
+        </p:style>
+        <p:txBody>
+          <a:bodyPr rtlCol="0" anchor="ctr"/>
+          <a:lstStyle/>
+          <a:p>
+            <a:pPr algn="ctr"/>
+            <a:endParaRPr lang="en-US"/>
+          </a:p>
+        </p:txBody>
+      </p:sp>
+      <p:cxnSp>
+        <p:nvCxnSpPr>
+          <p:cNvPr id="62" name="Straight Arrow Connector 61">
+            <a:extLst>
+              <a:ext uri="{FF2B5EF4-FFF2-40B4-BE49-F238E27FC236}">
+                <a16:creationId xmlns:a16="http://schemas.microsoft.com/office/drawing/2014/main" id="{521FA7EB-35B9-F712-D0E9-BD3DB4F12632}"/>
+              </a:ext>
+            </a:extLst>
+          </p:cNvPr>
+          <p:cNvCxnSpPr/>
+          <p:nvPr/>
+        </p:nvCxnSpPr>
+        <p:spPr>
+          <a:xfrm>
+            <a:off x="1959109" y="5176330"/>
+            <a:ext cx="7588764" cy="0"/>
+          </a:xfrm>
+          <a:prstGeom prst="straightConnector1">
+            <a:avLst/>
+          </a:prstGeom>
+          <a:ln>
+            <a:tailEnd type="triangle"/>
+          </a:ln>
+        </p:spPr>
+        <p:style>
+          <a:lnRef idx="1">
+            <a:schemeClr val="accent1"/>
+          </a:lnRef>
+          <a:fillRef idx="0">
+            <a:schemeClr val="accent1"/>
+          </a:fillRef>
+          <a:effectRef idx="0">
+            <a:schemeClr val="accent1"/>
+          </a:effectRef>
+          <a:fontRef idx="minor">
+            <a:schemeClr val="tx1"/>
+          </a:fontRef>
+        </p:style>
+      </p:cxnSp>
+      <p:sp>
+        <p:nvSpPr>
+          <p:cNvPr id="63" name="TextBox 62">
+            <a:extLst>
+              <a:ext uri="{FF2B5EF4-FFF2-40B4-BE49-F238E27FC236}">
+                <a16:creationId xmlns:a16="http://schemas.microsoft.com/office/drawing/2014/main" id="{FDE5F30D-7686-D1CD-1897-1314F467D9F7}"/>
+              </a:ext>
+            </a:extLst>
+          </p:cNvPr>
+          <p:cNvSpPr txBox="1"/>
+          <p:nvPr/>
+        </p:nvSpPr>
+        <p:spPr>
+          <a:xfrm>
+            <a:off x="3852410" y="5236115"/>
+            <a:ext cx="4616123" cy="369332"/>
+          </a:xfrm>
+          <a:prstGeom prst="rect">
+            <a:avLst/>
+          </a:prstGeom>
+          <a:noFill/>
+        </p:spPr>
+        <p:txBody>
+          <a:bodyPr wrap="square">
+            <a:spAutoFit/>
+          </a:bodyPr>
+          <a:lstStyle/>
+          <a:p>
+            <a:r>
+              <a:rPr lang="en-US" dirty="0"/>
+              <a:t>Real Time Computation / Signal Processing</a:t>
+            </a:r>
+          </a:p>
+        </p:txBody>
+      </p:sp>
+      <p:sp>
+        <p:nvSpPr>
+          <p:cNvPr id="64" name="TextBox 63">
+            <a:extLst>
+              <a:ext uri="{FF2B5EF4-FFF2-40B4-BE49-F238E27FC236}">
+                <a16:creationId xmlns:a16="http://schemas.microsoft.com/office/drawing/2014/main" id="{6AECE9DC-F3DF-32BA-5424-20A98ADEE1DB}"/>
+              </a:ext>
+            </a:extLst>
+          </p:cNvPr>
+          <p:cNvSpPr txBox="1"/>
+          <p:nvPr/>
+        </p:nvSpPr>
+        <p:spPr>
+          <a:xfrm>
+            <a:off x="1827885" y="5197940"/>
+            <a:ext cx="1492034" cy="646331"/>
+          </a:xfrm>
+          <a:prstGeom prst="rect">
+            <a:avLst/>
+          </a:prstGeom>
+          <a:noFill/>
+        </p:spPr>
+        <p:txBody>
+          <a:bodyPr wrap="square">
+            <a:spAutoFit/>
+          </a:bodyPr>
+          <a:lstStyle/>
+          <a:p>
+            <a:r>
+              <a:rPr lang="en-US" i="1" dirty="0"/>
+              <a:t>t</a:t>
+            </a:r>
+          </a:p>
+          <a:p>
+            <a:r>
+              <a:rPr lang="en-US" dirty="0"/>
+              <a:t>Time until Tx</a:t>
+            </a:r>
+          </a:p>
+        </p:txBody>
+      </p:sp>
+      <p:sp>
+        <p:nvSpPr>
+          <p:cNvPr id="65" name="Rectangle 64">
+            <a:extLst>
+              <a:ext uri="{FF2B5EF4-FFF2-40B4-BE49-F238E27FC236}">
+                <a16:creationId xmlns:a16="http://schemas.microsoft.com/office/drawing/2014/main" id="{2123DEBC-730F-A130-490B-509AA31C3A08}"/>
+              </a:ext>
+            </a:extLst>
+          </p:cNvPr>
+          <p:cNvSpPr/>
+          <p:nvPr/>
+        </p:nvSpPr>
+        <p:spPr>
+          <a:xfrm>
+            <a:off x="2294623" y="4519491"/>
+            <a:ext cx="272782" cy="280554"/>
+          </a:xfrm>
+          <a:prstGeom prst="rect">
+            <a:avLst/>
+          </a:prstGeom>
+          <a:solidFill>
+            <a:schemeClr val="accent6">
+              <a:lumMod val="60000"/>
+              <a:lumOff val="40000"/>
+            </a:schemeClr>
+          </a:solidFill>
+          <a:ln>
+            <a:noFill/>
+          </a:ln>
+        </p:spPr>
+        <p:style>
+          <a:lnRef idx="2">
+            <a:schemeClr val="accent1">
+              <a:shade val="50000"/>
+            </a:schemeClr>
+          </a:lnRef>
+          <a:fillRef idx="1">
+            <a:schemeClr val="accent1"/>
+          </a:fillRef>
+          <a:effectRef idx="0">
+            <a:schemeClr val="accent1"/>
+          </a:effectRef>
+          <a:fontRef idx="minor">
+            <a:schemeClr val="lt1"/>
+          </a:fontRef>
+        </p:style>
+        <p:txBody>
+          <a:bodyPr rtlCol="0" anchor="ctr"/>
+          <a:lstStyle/>
+          <a:p>
+            <a:pPr algn="ctr"/>
+            <a:endParaRPr lang="en-US" dirty="0">
+              <a:solidFill>
+                <a:schemeClr val="tx1"/>
+              </a:solidFill>
+            </a:endParaRPr>
+          </a:p>
+        </p:txBody>
+      </p:sp>
+      <p:sp>
+        <p:nvSpPr>
+          <p:cNvPr id="66" name="Rectangle 65">
+            <a:extLst>
+              <a:ext uri="{FF2B5EF4-FFF2-40B4-BE49-F238E27FC236}">
+                <a16:creationId xmlns:a16="http://schemas.microsoft.com/office/drawing/2014/main" id="{9CF586D8-0A27-8F2B-3A5A-E7C540CD43A9}"/>
+              </a:ext>
+            </a:extLst>
+          </p:cNvPr>
+          <p:cNvSpPr/>
+          <p:nvPr/>
+        </p:nvSpPr>
+        <p:spPr>
+          <a:xfrm>
+            <a:off x="2654841" y="4519491"/>
+            <a:ext cx="272782" cy="280554"/>
+          </a:xfrm>
+          <a:prstGeom prst="rect">
+            <a:avLst/>
+          </a:prstGeom>
+          <a:solidFill>
+            <a:schemeClr val="accent6">
+              <a:lumMod val="60000"/>
+              <a:lumOff val="40000"/>
+            </a:schemeClr>
+          </a:solidFill>
+          <a:ln>
+            <a:noFill/>
+          </a:ln>
+        </p:spPr>
+        <p:style>
+          <a:lnRef idx="2">
+            <a:schemeClr val="accent1">
+              <a:shade val="50000"/>
+            </a:schemeClr>
+          </a:lnRef>
+          <a:fillRef idx="1">
+            <a:schemeClr val="accent1"/>
+          </a:fillRef>
+          <a:effectRef idx="0">
+            <a:schemeClr val="accent1"/>
+          </a:effectRef>
+          <a:fontRef idx="minor">
+            <a:schemeClr val="lt1"/>
+          </a:fontRef>
+        </p:style>
+        <p:txBody>
+          <a:bodyPr rtlCol="0" anchor="ctr"/>
+          <a:lstStyle/>
+          <a:p>
+            <a:pPr algn="ctr"/>
+            <a:endParaRPr lang="en-US" dirty="0">
+              <a:solidFill>
+                <a:schemeClr val="tx1"/>
+              </a:solidFill>
+            </a:endParaRPr>
+          </a:p>
+        </p:txBody>
+      </p:sp>
+      <p:sp>
+        <p:nvSpPr>
+          <p:cNvPr id="67" name="Rectangle 66">
+            <a:extLst>
+              <a:ext uri="{FF2B5EF4-FFF2-40B4-BE49-F238E27FC236}">
+                <a16:creationId xmlns:a16="http://schemas.microsoft.com/office/drawing/2014/main" id="{40FA0333-1F7A-4D55-51B5-FAC12D0D12BE}"/>
+              </a:ext>
+            </a:extLst>
+          </p:cNvPr>
+          <p:cNvSpPr/>
+          <p:nvPr/>
+        </p:nvSpPr>
+        <p:spPr>
+          <a:xfrm>
+            <a:off x="3037596" y="4519491"/>
+            <a:ext cx="272782" cy="280554"/>
+          </a:xfrm>
+          <a:prstGeom prst="rect">
+            <a:avLst/>
+          </a:prstGeom>
+          <a:solidFill>
+            <a:schemeClr val="accent6">
+              <a:lumMod val="60000"/>
+              <a:lumOff val="40000"/>
+            </a:schemeClr>
+          </a:solidFill>
+          <a:ln>
+            <a:noFill/>
+          </a:ln>
+        </p:spPr>
+        <p:style>
+          <a:lnRef idx="2">
+            <a:schemeClr val="accent1">
+              <a:shade val="50000"/>
+            </a:schemeClr>
+          </a:lnRef>
+          <a:fillRef idx="1">
+            <a:schemeClr val="accent1"/>
+          </a:fillRef>
+          <a:effectRef idx="0">
+            <a:schemeClr val="accent1"/>
+          </a:effectRef>
+          <a:fontRef idx="minor">
+            <a:schemeClr val="lt1"/>
+          </a:fontRef>
+        </p:style>
+        <p:txBody>
+          <a:bodyPr rtlCol="0" anchor="ctr"/>
+          <a:lstStyle/>
+          <a:p>
+            <a:pPr algn="ctr"/>
+            <a:endParaRPr lang="en-US" dirty="0">
+              <a:solidFill>
+                <a:schemeClr val="tx1"/>
+              </a:solidFill>
+            </a:endParaRPr>
+          </a:p>
+        </p:txBody>
+      </p:sp>
+      <p:sp>
+        <p:nvSpPr>
+          <p:cNvPr id="68" name="Rectangle 67">
+            <a:extLst>
+              <a:ext uri="{FF2B5EF4-FFF2-40B4-BE49-F238E27FC236}">
+                <a16:creationId xmlns:a16="http://schemas.microsoft.com/office/drawing/2014/main" id="{C4F3034C-4DE5-4CE7-F43F-3CFDF2C4AB83}"/>
+              </a:ext>
+            </a:extLst>
+          </p:cNvPr>
+          <p:cNvSpPr/>
+          <p:nvPr/>
+        </p:nvSpPr>
+        <p:spPr>
+          <a:xfrm>
+            <a:off x="3408205" y="4519491"/>
+            <a:ext cx="272782" cy="280554"/>
+          </a:xfrm>
+          <a:prstGeom prst="rect">
+            <a:avLst/>
+          </a:prstGeom>
+          <a:solidFill>
+            <a:schemeClr val="accent6">
+              <a:lumMod val="60000"/>
+              <a:lumOff val="40000"/>
+            </a:schemeClr>
+          </a:solidFill>
+          <a:ln>
+            <a:noFill/>
+          </a:ln>
+        </p:spPr>
+        <p:style>
+          <a:lnRef idx="2">
+            <a:schemeClr val="accent1">
+              <a:shade val="50000"/>
+            </a:schemeClr>
+          </a:lnRef>
+          <a:fillRef idx="1">
+            <a:schemeClr val="accent1"/>
+          </a:fillRef>
+          <a:effectRef idx="0">
+            <a:schemeClr val="accent1"/>
+          </a:effectRef>
+          <a:fontRef idx="minor">
+            <a:schemeClr val="lt1"/>
+          </a:fontRef>
+        </p:style>
+        <p:txBody>
+          <a:bodyPr rtlCol="0" anchor="ctr"/>
+          <a:lstStyle/>
+          <a:p>
+            <a:pPr algn="ctr"/>
+            <a:endParaRPr lang="en-US" dirty="0">
+              <a:solidFill>
+                <a:schemeClr val="tx1"/>
+              </a:solidFill>
+            </a:endParaRPr>
+          </a:p>
+        </p:txBody>
+      </p:sp>
+      <p:sp>
+        <p:nvSpPr>
+          <p:cNvPr id="69" name="Rectangle 68">
+            <a:extLst>
+              <a:ext uri="{FF2B5EF4-FFF2-40B4-BE49-F238E27FC236}">
+                <a16:creationId xmlns:a16="http://schemas.microsoft.com/office/drawing/2014/main" id="{1A05FC03-3BC2-A81A-601F-55669E9885CB}"/>
+              </a:ext>
+            </a:extLst>
+          </p:cNvPr>
+          <p:cNvSpPr/>
+          <p:nvPr/>
+        </p:nvSpPr>
+        <p:spPr>
+          <a:xfrm>
+            <a:off x="3768423" y="4519491"/>
+            <a:ext cx="272782" cy="280554"/>
+          </a:xfrm>
+          <a:prstGeom prst="rect">
+            <a:avLst/>
+          </a:prstGeom>
+          <a:solidFill>
+            <a:schemeClr val="accent6">
+              <a:lumMod val="60000"/>
+              <a:lumOff val="40000"/>
+            </a:schemeClr>
+          </a:solidFill>
+          <a:ln>
+            <a:noFill/>
+          </a:ln>
+        </p:spPr>
+        <p:style>
+          <a:lnRef idx="2">
+            <a:schemeClr val="accent1">
+              <a:shade val="50000"/>
+            </a:schemeClr>
+          </a:lnRef>
+          <a:fillRef idx="1">
+            <a:schemeClr val="accent1"/>
+          </a:fillRef>
+          <a:effectRef idx="0">
+            <a:schemeClr val="accent1"/>
+          </a:effectRef>
+          <a:fontRef idx="minor">
+            <a:schemeClr val="lt1"/>
+          </a:fontRef>
+        </p:style>
+        <p:txBody>
+          <a:bodyPr rtlCol="0" anchor="ctr"/>
+          <a:lstStyle/>
+          <a:p>
+            <a:pPr algn="ctr"/>
+            <a:endParaRPr lang="en-US" dirty="0">
+              <a:solidFill>
+                <a:schemeClr val="tx1"/>
+              </a:solidFill>
+            </a:endParaRPr>
+          </a:p>
+        </p:txBody>
+      </p:sp>
+      <p:sp>
+        <p:nvSpPr>
+          <p:cNvPr id="70" name="Rectangle 69">
+            <a:extLst>
+              <a:ext uri="{FF2B5EF4-FFF2-40B4-BE49-F238E27FC236}">
+                <a16:creationId xmlns:a16="http://schemas.microsoft.com/office/drawing/2014/main" id="{D735903B-87CF-1B67-55BC-DF3DB18AD43E}"/>
+              </a:ext>
+            </a:extLst>
+          </p:cNvPr>
+          <p:cNvSpPr/>
+          <p:nvPr/>
+        </p:nvSpPr>
+        <p:spPr>
+          <a:xfrm>
+            <a:off x="5122709" y="4504835"/>
+            <a:ext cx="272782" cy="280554"/>
+          </a:xfrm>
+          <a:prstGeom prst="rect">
+            <a:avLst/>
+          </a:prstGeom>
+          <a:solidFill>
+            <a:schemeClr val="accent6">
+              <a:lumMod val="60000"/>
+              <a:lumOff val="40000"/>
+            </a:schemeClr>
+          </a:solidFill>
+          <a:ln>
+            <a:noFill/>
+          </a:ln>
+        </p:spPr>
+        <p:style>
+          <a:lnRef idx="2">
+            <a:schemeClr val="accent1">
+              <a:shade val="50000"/>
+            </a:schemeClr>
+          </a:lnRef>
+          <a:fillRef idx="1">
+            <a:schemeClr val="accent1"/>
+          </a:fillRef>
+          <a:effectRef idx="0">
+            <a:schemeClr val="accent1"/>
+          </a:effectRef>
+          <a:fontRef idx="minor">
+            <a:schemeClr val="lt1"/>
+          </a:fontRef>
+        </p:style>
+        <p:txBody>
+          <a:bodyPr rtlCol="0" anchor="ctr"/>
+          <a:lstStyle/>
+          <a:p>
+            <a:pPr algn="ctr"/>
+            <a:endParaRPr lang="en-US" dirty="0">
+              <a:solidFill>
+                <a:schemeClr val="tx1"/>
+              </a:solidFill>
+            </a:endParaRPr>
+          </a:p>
+        </p:txBody>
+      </p:sp>
+      <p:sp>
+        <p:nvSpPr>
+          <p:cNvPr id="74" name="Freeform: Shape 73">
+            <a:extLst>
+              <a:ext uri="{FF2B5EF4-FFF2-40B4-BE49-F238E27FC236}">
+                <a16:creationId xmlns:a16="http://schemas.microsoft.com/office/drawing/2014/main" id="{79D314AB-293C-FC70-F8DF-D409779ACC05}"/>
+              </a:ext>
+            </a:extLst>
+          </p:cNvPr>
+          <p:cNvSpPr/>
+          <p:nvPr/>
+        </p:nvSpPr>
+        <p:spPr>
+          <a:xfrm>
+            <a:off x="5912427" y="4395357"/>
+            <a:ext cx="3688773" cy="353298"/>
+          </a:xfrm>
+          <a:custGeom>
+            <a:avLst/>
+            <a:gdLst>
+              <a:gd name="connsiteX0" fmla="*/ 0 w 3688773"/>
+              <a:gd name="connsiteY0" fmla="*/ 270164 h 353298"/>
+              <a:gd name="connsiteX1" fmla="*/ 592282 w 3688773"/>
+              <a:gd name="connsiteY1" fmla="*/ 41564 h 353298"/>
+              <a:gd name="connsiteX2" fmla="*/ 1163782 w 3688773"/>
+              <a:gd name="connsiteY2" fmla="*/ 353291 h 353298"/>
+              <a:gd name="connsiteX3" fmla="*/ 1839191 w 3688773"/>
+              <a:gd name="connsiteY3" fmla="*/ 51955 h 353298"/>
+              <a:gd name="connsiteX4" fmla="*/ 2462646 w 3688773"/>
+              <a:gd name="connsiteY4" fmla="*/ 270164 h 353298"/>
+              <a:gd name="connsiteX5" fmla="*/ 3096491 w 3688773"/>
+              <a:gd name="connsiteY5" fmla="*/ 0 h 353298"/>
+              <a:gd name="connsiteX6" fmla="*/ 3688773 w 3688773"/>
+              <a:gd name="connsiteY6" fmla="*/ 270164 h 353298"/>
+            </a:gdLst>
+            <a:ahLst/>
+            <a:cxnLst>
+              <a:cxn ang="0">
+                <a:pos x="connsiteX0" y="connsiteY0"/>
+              </a:cxn>
+              <a:cxn ang="0">
+                <a:pos x="connsiteX1" y="connsiteY1"/>
+              </a:cxn>
+              <a:cxn ang="0">
+                <a:pos x="connsiteX2" y="connsiteY2"/>
+              </a:cxn>
+              <a:cxn ang="0">
+                <a:pos x="connsiteX3" y="connsiteY3"/>
+              </a:cxn>
+              <a:cxn ang="0">
+                <a:pos x="connsiteX4" y="connsiteY4"/>
+              </a:cxn>
+              <a:cxn ang="0">
+                <a:pos x="connsiteX5" y="connsiteY5"/>
+              </a:cxn>
+              <a:cxn ang="0">
+                <a:pos x="connsiteX6" y="connsiteY6"/>
+              </a:cxn>
+            </a:cxnLst>
+            <a:rect l="l" t="t" r="r" b="b"/>
+            <a:pathLst>
+              <a:path w="3688773" h="353298">
+                <a:moveTo>
+                  <a:pt x="0" y="270164"/>
+                </a:moveTo>
+                <a:cubicBezTo>
+                  <a:pt x="199159" y="148937"/>
+                  <a:pt x="398318" y="27710"/>
+                  <a:pt x="592282" y="41564"/>
+                </a:cubicBezTo>
+                <a:cubicBezTo>
+                  <a:pt x="786246" y="55418"/>
+                  <a:pt x="955964" y="351559"/>
+                  <a:pt x="1163782" y="353291"/>
+                </a:cubicBezTo>
+                <a:cubicBezTo>
+                  <a:pt x="1371600" y="355023"/>
+                  <a:pt x="1622714" y="65809"/>
+                  <a:pt x="1839191" y="51955"/>
+                </a:cubicBezTo>
+                <a:cubicBezTo>
+                  <a:pt x="2055668" y="38101"/>
+                  <a:pt x="2253096" y="278823"/>
+                  <a:pt x="2462646" y="270164"/>
+                </a:cubicBezTo>
+                <a:cubicBezTo>
+                  <a:pt x="2672196" y="261505"/>
+                  <a:pt x="2892137" y="0"/>
+                  <a:pt x="3096491" y="0"/>
+                </a:cubicBezTo>
+                <a:cubicBezTo>
+                  <a:pt x="3300845" y="0"/>
+                  <a:pt x="3494809" y="135082"/>
+                  <a:pt x="3688773" y="270164"/>
+                </a:cubicBezTo>
+              </a:path>
+            </a:pathLst>
+          </a:custGeom>
+          <a:noFill/>
+        </p:spPr>
+        <p:style>
+          <a:lnRef idx="2">
+            <a:schemeClr val="accent1">
+              <a:shade val="50000"/>
+            </a:schemeClr>
+          </a:lnRef>
+          <a:fillRef idx="1">
+            <a:schemeClr val="accent1"/>
+          </a:fillRef>
+          <a:effectRef idx="0">
+            <a:schemeClr val="accent1"/>
+          </a:effectRef>
+          <a:fontRef idx="minor">
+            <a:schemeClr val="lt1"/>
+          </a:fontRef>
+        </p:style>
+        <p:txBody>
+          <a:bodyPr rtlCol="0" anchor="ctr"/>
+          <a:lstStyle/>
+          <a:p>
+            <a:pPr algn="ctr"/>
+            <a:endParaRPr lang="en-US"/>
+          </a:p>
+        </p:txBody>
+      </p:sp>
+      <p:sp>
+        <p:nvSpPr>
+          <p:cNvPr id="75" name="TextBox 74">
+            <a:extLst>
+              <a:ext uri="{FF2B5EF4-FFF2-40B4-BE49-F238E27FC236}">
+                <a16:creationId xmlns:a16="http://schemas.microsoft.com/office/drawing/2014/main" id="{07A8157C-1675-BD63-52FA-5BB207657381}"/>
+              </a:ext>
+            </a:extLst>
+          </p:cNvPr>
+          <p:cNvSpPr txBox="1"/>
+          <p:nvPr/>
+        </p:nvSpPr>
+        <p:spPr>
+          <a:xfrm>
+            <a:off x="9421929" y="4736262"/>
+            <a:ext cx="301686" cy="369332"/>
+          </a:xfrm>
+          <a:prstGeom prst="rect">
+            <a:avLst/>
+          </a:prstGeom>
+          <a:noFill/>
+        </p:spPr>
+        <p:txBody>
+          <a:bodyPr wrap="none" rtlCol="0">
+            <a:spAutoFit/>
+          </a:bodyPr>
+          <a:lstStyle/>
+          <a:p>
+            <a:r>
+              <a:rPr lang="en-US" dirty="0"/>
+              <a:t>0</a:t>
+            </a:r>
+          </a:p>
+        </p:txBody>
+      </p:sp>
+      <p:sp>
+        <p:nvSpPr>
+          <p:cNvPr id="76" name="TextBox 75">
+            <a:extLst>
+              <a:ext uri="{FF2B5EF4-FFF2-40B4-BE49-F238E27FC236}">
+                <a16:creationId xmlns:a16="http://schemas.microsoft.com/office/drawing/2014/main" id="{BFD5DE64-B690-2BC3-9750-FCE2408F20CA}"/>
+              </a:ext>
+            </a:extLst>
+          </p:cNvPr>
+          <p:cNvSpPr txBox="1"/>
+          <p:nvPr/>
+        </p:nvSpPr>
+        <p:spPr>
+          <a:xfrm>
+            <a:off x="7913785" y="4732281"/>
+            <a:ext cx="301686" cy="369332"/>
+          </a:xfrm>
+          <a:prstGeom prst="rect">
+            <a:avLst/>
+          </a:prstGeom>
+          <a:noFill/>
+        </p:spPr>
+        <p:txBody>
+          <a:bodyPr wrap="none" rtlCol="0">
+            <a:spAutoFit/>
+          </a:bodyPr>
+          <a:lstStyle/>
+          <a:p>
+            <a:r>
+              <a:rPr lang="en-US" dirty="0"/>
+              <a:t>1</a:t>
+            </a:r>
+          </a:p>
+        </p:txBody>
+      </p:sp>
+      <p:sp>
+        <p:nvSpPr>
+          <p:cNvPr id="77" name="TextBox 76">
+            <a:extLst>
+              <a:ext uri="{FF2B5EF4-FFF2-40B4-BE49-F238E27FC236}">
+                <a16:creationId xmlns:a16="http://schemas.microsoft.com/office/drawing/2014/main" id="{927160ED-00DB-78E4-B553-F8DDA08DC8D3}"/>
+              </a:ext>
+            </a:extLst>
+          </p:cNvPr>
+          <p:cNvSpPr txBox="1"/>
+          <p:nvPr/>
+        </p:nvSpPr>
+        <p:spPr>
+          <a:xfrm>
+            <a:off x="6536553" y="4748669"/>
+            <a:ext cx="301686" cy="369332"/>
+          </a:xfrm>
+          <a:prstGeom prst="rect">
+            <a:avLst/>
+          </a:prstGeom>
+          <a:noFill/>
+        </p:spPr>
+        <p:txBody>
+          <a:bodyPr wrap="none" rtlCol="0">
+            <a:spAutoFit/>
+          </a:bodyPr>
+          <a:lstStyle/>
+          <a:p>
+            <a:r>
+              <a:rPr lang="en-US" dirty="0"/>
+              <a:t>2</a:t>
+            </a:r>
+          </a:p>
+        </p:txBody>
+      </p:sp>
+      <p:sp>
+        <p:nvSpPr>
+          <p:cNvPr id="78" name="TextBox 77">
+            <a:extLst>
+              <a:ext uri="{FF2B5EF4-FFF2-40B4-BE49-F238E27FC236}">
+                <a16:creationId xmlns:a16="http://schemas.microsoft.com/office/drawing/2014/main" id="{E4E4D4FB-7ACD-17C0-F628-36FD96A8C319}"/>
+              </a:ext>
+            </a:extLst>
+          </p:cNvPr>
+          <p:cNvSpPr txBox="1"/>
+          <p:nvPr/>
+        </p:nvSpPr>
+        <p:spPr>
+          <a:xfrm>
+            <a:off x="5120091" y="4745215"/>
+            <a:ext cx="301686" cy="369332"/>
+          </a:xfrm>
+          <a:prstGeom prst="rect">
+            <a:avLst/>
+          </a:prstGeom>
+          <a:noFill/>
+        </p:spPr>
+        <p:txBody>
+          <a:bodyPr wrap="none" rtlCol="0">
+            <a:spAutoFit/>
+          </a:bodyPr>
+          <a:lstStyle/>
+          <a:p>
+            <a:r>
+              <a:rPr lang="en-US" dirty="0"/>
+              <a:t>3</a:t>
+            </a:r>
+          </a:p>
+        </p:txBody>
+      </p:sp>
+      <p:sp>
+        <p:nvSpPr>
+          <p:cNvPr id="79" name="TextBox 78">
+            <a:extLst>
+              <a:ext uri="{FF2B5EF4-FFF2-40B4-BE49-F238E27FC236}">
+                <a16:creationId xmlns:a16="http://schemas.microsoft.com/office/drawing/2014/main" id="{3A695180-B1A8-4050-AFAB-C993F969885E}"/>
+              </a:ext>
+            </a:extLst>
+          </p:cNvPr>
+          <p:cNvSpPr txBox="1"/>
+          <p:nvPr/>
+        </p:nvSpPr>
+        <p:spPr>
+          <a:xfrm>
+            <a:off x="2280171" y="4797827"/>
+            <a:ext cx="1761034" cy="369332"/>
+          </a:xfrm>
+          <a:prstGeom prst="rect">
+            <a:avLst/>
+          </a:prstGeom>
+          <a:noFill/>
+        </p:spPr>
+        <p:txBody>
+          <a:bodyPr wrap="square" rtlCol="0">
+            <a:spAutoFit/>
+          </a:bodyPr>
+          <a:lstStyle/>
+          <a:p>
+            <a:r>
+              <a:rPr lang="en-US" dirty="0"/>
+              <a:t>8     7     6     5    4</a:t>
+            </a:r>
+          </a:p>
+        </p:txBody>
+      </p:sp>
+    </p:spTree>
+    <p:extLst>
+      <p:ext uri="{BB962C8B-B14F-4D97-AF65-F5344CB8AC3E}">
+        <p14:creationId xmlns:p14="http://schemas.microsoft.com/office/powerpoint/2010/main" val="3893841811"/>
+      </p:ext>
+    </p:extLst>
+  </p:cSld>
+  <p:clrMapOvr>
+    <a:masterClrMapping/>
+  </p:clrMapOvr>
+</p:sld>
+</file>
+
 <file path=ppt/theme/theme1.xml><?xml version="1.0" encoding="utf-8"?>
 <a:theme xmlns:a="http://schemas.openxmlformats.org/drawingml/2006/main" name="Office Theme">
   <a:themeElements>

</xml_diff>